<commit_message>
log scale and color
</commit_message>
<xml_diff>
--- a/assets/infographic.pptx
+++ b/assets/infographic.pptx
@@ -2,13 +2,12 @@
 <file path=ppt/presentation.xml><?xml version="1.0" encoding="utf-8"?>
 <p:presentation xmlns:a="http://schemas.openxmlformats.org/drawingml/2006/main" xmlns:r="http://schemas.openxmlformats.org/officeDocument/2006/relationships" xmlns:p="http://schemas.openxmlformats.org/presentationml/2006/main" saveSubsetFonts="1">
   <p:sldMasterIdLst>
-    <p:sldMasterId id="2147483660" r:id="rId1"/>
+    <p:sldMasterId id="2147483684" r:id="rId1"/>
   </p:sldMasterIdLst>
   <p:sldIdLst>
-    <p:sldId id="256" r:id="rId2"/>
-    <p:sldId id="258" r:id="rId3"/>
+    <p:sldId id="259" r:id="rId2"/>
   </p:sldIdLst>
-  <p:sldSz cx="12192000" cy="8229600"/>
+  <p:sldSz cx="13716000" cy="8229600"/>
   <p:notesSz cx="6858000" cy="9144000"/>
   <p:defaultTextStyle>
     <a:defPPr>
@@ -105,7 +104,1253 @@
       </a:defRPr>
     </a:lvl9pPr>
   </p:defaultTextStyle>
+  <p:extLst>
+    <p:ext uri="{EFAFB233-063F-42B5-8137-9DF3F51BA10A}">
+      <p15:sldGuideLst xmlns:p15="http://schemas.microsoft.com/office/powerpoint/2012/main"/>
+    </p:ext>
+  </p:extLst>
 </p:presentation>
+</file>
+
+<file path=ppt/revisionInfo.xml><?xml version="1.0" encoding="utf-8"?>
+<p1510:revInfo xmlns:a="http://schemas.openxmlformats.org/drawingml/2006/main" xmlns:r="http://schemas.openxmlformats.org/officeDocument/2006/relationships" xmlns:p1510="http://schemas.microsoft.com/office/powerpoint/2015/10/main">
+  <p1510:revLst>
+    <p1510:client id="{CD1204E6-FD34-478A-94B4-F7EB36BAC6C8}" v="152" dt="2024-11-18T19:36:33.691"/>
+  </p1510:revLst>
+</p1510:revInfo>
+</file>
+
+<file path=ppt/changesInfos/changesInfo1.xml><?xml version="1.0" encoding="utf-8"?>
+<pc:chgInfo xmlns:a="http://schemas.openxmlformats.org/drawingml/2006/main" xmlns:r="http://schemas.openxmlformats.org/officeDocument/2006/relationships" xmlns:ac="http://schemas.microsoft.com/office/drawing/2013/main/command" xmlns:pc="http://schemas.microsoft.com/office/powerpoint/2013/main/command">
+  <pc:docChgLst>
+    <pc:chgData name="Khitalishvili, Koba" userId="c02c2335-1b21-4459-93e3-a2125e4631b1" providerId="ADAL" clId="{CD1204E6-FD34-478A-94B4-F7EB36BAC6C8}"/>
+    <pc:docChg chg="undo custSel addSld delSld modSld modMainMaster">
+      <pc:chgData name="Khitalishvili, Koba" userId="c02c2335-1b21-4459-93e3-a2125e4631b1" providerId="ADAL" clId="{CD1204E6-FD34-478A-94B4-F7EB36BAC6C8}" dt="2024-11-18T19:36:23.106" v="222"/>
+      <pc:docMkLst>
+        <pc:docMk/>
+      </pc:docMkLst>
+      <pc:sldChg chg="del">
+        <pc:chgData name="Khitalishvili, Koba" userId="c02c2335-1b21-4459-93e3-a2125e4631b1" providerId="ADAL" clId="{CD1204E6-FD34-478A-94B4-F7EB36BAC6C8}" dt="2024-11-18T18:49:05.062" v="0" actId="2696"/>
+        <pc:sldMkLst>
+          <pc:docMk/>
+          <pc:sldMk cId="3236357601" sldId="256"/>
+        </pc:sldMkLst>
+      </pc:sldChg>
+      <pc:sldChg chg="modSp del">
+        <pc:chgData name="Khitalishvili, Koba" userId="c02c2335-1b21-4459-93e3-a2125e4631b1" providerId="ADAL" clId="{CD1204E6-FD34-478A-94B4-F7EB36BAC6C8}" dt="2024-11-18T19:15:17.198" v="221" actId="47"/>
+        <pc:sldMkLst>
+          <pc:docMk/>
+          <pc:sldMk cId="1378656094" sldId="258"/>
+        </pc:sldMkLst>
+        <pc:spChg chg="mod">
+          <ac:chgData name="Khitalishvili, Koba" userId="c02c2335-1b21-4459-93e3-a2125e4631b1" providerId="ADAL" clId="{CD1204E6-FD34-478A-94B4-F7EB36BAC6C8}" dt="2024-11-18T19:14:38.387" v="220"/>
+          <ac:spMkLst>
+            <pc:docMk/>
+            <pc:sldMk cId="1378656094" sldId="258"/>
+            <ac:spMk id="6" creationId="{9746B6E1-57FD-E6DD-67A7-CA3969747068}"/>
+          </ac:spMkLst>
+        </pc:spChg>
+        <pc:spChg chg="mod">
+          <ac:chgData name="Khitalishvili, Koba" userId="c02c2335-1b21-4459-93e3-a2125e4631b1" providerId="ADAL" clId="{CD1204E6-FD34-478A-94B4-F7EB36BAC6C8}" dt="2024-11-18T19:14:38.387" v="220"/>
+          <ac:spMkLst>
+            <pc:docMk/>
+            <pc:sldMk cId="1378656094" sldId="258"/>
+            <ac:spMk id="7" creationId="{4D897325-BC50-79C1-8726-F77CCBDF9FFB}"/>
+          </ac:spMkLst>
+        </pc:spChg>
+        <pc:spChg chg="mod">
+          <ac:chgData name="Khitalishvili, Koba" userId="c02c2335-1b21-4459-93e3-a2125e4631b1" providerId="ADAL" clId="{CD1204E6-FD34-478A-94B4-F7EB36BAC6C8}" dt="2024-11-18T19:14:38.387" v="220"/>
+          <ac:spMkLst>
+            <pc:docMk/>
+            <pc:sldMk cId="1378656094" sldId="258"/>
+            <ac:spMk id="8" creationId="{24417EC7-7555-7606-8FCB-345BBBF1F3D4}"/>
+          </ac:spMkLst>
+        </pc:spChg>
+        <pc:spChg chg="mod">
+          <ac:chgData name="Khitalishvili, Koba" userId="c02c2335-1b21-4459-93e3-a2125e4631b1" providerId="ADAL" clId="{CD1204E6-FD34-478A-94B4-F7EB36BAC6C8}" dt="2024-11-18T19:14:38.387" v="220"/>
+          <ac:spMkLst>
+            <pc:docMk/>
+            <pc:sldMk cId="1378656094" sldId="258"/>
+            <ac:spMk id="9" creationId="{355F2020-3D35-32BF-4540-C4C04F2E4E74}"/>
+          </ac:spMkLst>
+        </pc:spChg>
+        <pc:spChg chg="mod">
+          <ac:chgData name="Khitalishvili, Koba" userId="c02c2335-1b21-4459-93e3-a2125e4631b1" providerId="ADAL" clId="{CD1204E6-FD34-478A-94B4-F7EB36BAC6C8}" dt="2024-11-18T19:14:38.387" v="220"/>
+          <ac:spMkLst>
+            <pc:docMk/>
+            <pc:sldMk cId="1378656094" sldId="258"/>
+            <ac:spMk id="10" creationId="{021BBFD7-1D8D-CAD6-BD1D-9639C47E1198}"/>
+          </ac:spMkLst>
+        </pc:spChg>
+        <pc:spChg chg="mod">
+          <ac:chgData name="Khitalishvili, Koba" userId="c02c2335-1b21-4459-93e3-a2125e4631b1" providerId="ADAL" clId="{CD1204E6-FD34-478A-94B4-F7EB36BAC6C8}" dt="2024-11-18T19:14:38.387" v="220"/>
+          <ac:spMkLst>
+            <pc:docMk/>
+            <pc:sldMk cId="1378656094" sldId="258"/>
+            <ac:spMk id="14" creationId="{233E8355-9EC3-299D-CFE3-9DCE69D10474}"/>
+          </ac:spMkLst>
+        </pc:spChg>
+        <pc:spChg chg="mod">
+          <ac:chgData name="Khitalishvili, Koba" userId="c02c2335-1b21-4459-93e3-a2125e4631b1" providerId="ADAL" clId="{CD1204E6-FD34-478A-94B4-F7EB36BAC6C8}" dt="2024-11-18T19:14:38.387" v="220"/>
+          <ac:spMkLst>
+            <pc:docMk/>
+            <pc:sldMk cId="1378656094" sldId="258"/>
+            <ac:spMk id="16" creationId="{EF11BBC3-C052-C330-56D4-2DA740DD5E9D}"/>
+          </ac:spMkLst>
+        </pc:spChg>
+        <pc:spChg chg="mod">
+          <ac:chgData name="Khitalishvili, Koba" userId="c02c2335-1b21-4459-93e3-a2125e4631b1" providerId="ADAL" clId="{CD1204E6-FD34-478A-94B4-F7EB36BAC6C8}" dt="2024-11-18T19:14:38.387" v="220"/>
+          <ac:spMkLst>
+            <pc:docMk/>
+            <pc:sldMk cId="1378656094" sldId="258"/>
+            <ac:spMk id="18" creationId="{CB7D104E-C82B-2B7B-0B41-DDB437FDD6F1}"/>
+          </ac:spMkLst>
+        </pc:spChg>
+        <pc:spChg chg="mod">
+          <ac:chgData name="Khitalishvili, Koba" userId="c02c2335-1b21-4459-93e3-a2125e4631b1" providerId="ADAL" clId="{CD1204E6-FD34-478A-94B4-F7EB36BAC6C8}" dt="2024-11-18T19:14:38.387" v="220"/>
+          <ac:spMkLst>
+            <pc:docMk/>
+            <pc:sldMk cId="1378656094" sldId="258"/>
+            <ac:spMk id="27" creationId="{A424C7FD-454F-2D07-B56A-32E11BC67086}"/>
+          </ac:spMkLst>
+        </pc:spChg>
+        <pc:spChg chg="mod">
+          <ac:chgData name="Khitalishvili, Koba" userId="c02c2335-1b21-4459-93e3-a2125e4631b1" providerId="ADAL" clId="{CD1204E6-FD34-478A-94B4-F7EB36BAC6C8}" dt="2024-11-18T19:14:38.387" v="220"/>
+          <ac:spMkLst>
+            <pc:docMk/>
+            <pc:sldMk cId="1378656094" sldId="258"/>
+            <ac:spMk id="29" creationId="{C034CBFE-317E-67B2-A55E-1004283B1F87}"/>
+          </ac:spMkLst>
+        </pc:spChg>
+        <pc:spChg chg="mod">
+          <ac:chgData name="Khitalishvili, Koba" userId="c02c2335-1b21-4459-93e3-a2125e4631b1" providerId="ADAL" clId="{CD1204E6-FD34-478A-94B4-F7EB36BAC6C8}" dt="2024-11-18T19:14:38.387" v="220"/>
+          <ac:spMkLst>
+            <pc:docMk/>
+            <pc:sldMk cId="1378656094" sldId="258"/>
+            <ac:spMk id="30" creationId="{7B4697EF-3261-062A-45DA-30FE9506C3B2}"/>
+          </ac:spMkLst>
+        </pc:spChg>
+        <pc:picChg chg="mod">
+          <ac:chgData name="Khitalishvili, Koba" userId="c02c2335-1b21-4459-93e3-a2125e4631b1" providerId="ADAL" clId="{CD1204E6-FD34-478A-94B4-F7EB36BAC6C8}" dt="2024-11-18T19:14:38.387" v="220"/>
+          <ac:picMkLst>
+            <pc:docMk/>
+            <pc:sldMk cId="1378656094" sldId="258"/>
+            <ac:picMk id="5" creationId="{24413B47-00F2-BC41-4DDF-6566CFB1BA84}"/>
+          </ac:picMkLst>
+        </pc:picChg>
+        <pc:picChg chg="mod">
+          <ac:chgData name="Khitalishvili, Koba" userId="c02c2335-1b21-4459-93e3-a2125e4631b1" providerId="ADAL" clId="{CD1204E6-FD34-478A-94B4-F7EB36BAC6C8}" dt="2024-11-18T19:14:38.387" v="220"/>
+          <ac:picMkLst>
+            <pc:docMk/>
+            <pc:sldMk cId="1378656094" sldId="258"/>
+            <ac:picMk id="26" creationId="{B236DC1F-1E88-067B-6504-B00FE7683649}"/>
+          </ac:picMkLst>
+        </pc:picChg>
+        <pc:picChg chg="mod">
+          <ac:chgData name="Khitalishvili, Koba" userId="c02c2335-1b21-4459-93e3-a2125e4631b1" providerId="ADAL" clId="{CD1204E6-FD34-478A-94B4-F7EB36BAC6C8}" dt="2024-11-18T19:14:38.387" v="220"/>
+          <ac:picMkLst>
+            <pc:docMk/>
+            <pc:sldMk cId="1378656094" sldId="258"/>
+            <ac:picMk id="1026" creationId="{BDC8E5D0-7FAC-97BF-5A3E-C4CF3130F9C8}"/>
+          </ac:picMkLst>
+        </pc:picChg>
+        <pc:picChg chg="mod">
+          <ac:chgData name="Khitalishvili, Koba" userId="c02c2335-1b21-4459-93e3-a2125e4631b1" providerId="ADAL" clId="{CD1204E6-FD34-478A-94B4-F7EB36BAC6C8}" dt="2024-11-18T19:14:38.387" v="220"/>
+          <ac:picMkLst>
+            <pc:docMk/>
+            <pc:sldMk cId="1378656094" sldId="258"/>
+            <ac:picMk id="1032" creationId="{B58E136A-3C1C-0E1C-4839-167CB7A3401F}"/>
+          </ac:picMkLst>
+        </pc:picChg>
+        <pc:picChg chg="mod">
+          <ac:chgData name="Khitalishvili, Koba" userId="c02c2335-1b21-4459-93e3-a2125e4631b1" providerId="ADAL" clId="{CD1204E6-FD34-478A-94B4-F7EB36BAC6C8}" dt="2024-11-18T19:14:38.387" v="220"/>
+          <ac:picMkLst>
+            <pc:docMk/>
+            <pc:sldMk cId="1378656094" sldId="258"/>
+            <ac:picMk id="1034" creationId="{8E25DE64-AA68-8A57-6976-B032DCF772CA}"/>
+          </ac:picMkLst>
+        </pc:picChg>
+        <pc:picChg chg="mod">
+          <ac:chgData name="Khitalishvili, Koba" userId="c02c2335-1b21-4459-93e3-a2125e4631b1" providerId="ADAL" clId="{CD1204E6-FD34-478A-94B4-F7EB36BAC6C8}" dt="2024-11-18T19:14:38.387" v="220"/>
+          <ac:picMkLst>
+            <pc:docMk/>
+            <pc:sldMk cId="1378656094" sldId="258"/>
+            <ac:picMk id="1036" creationId="{613D81A8-4A77-B755-740B-FC7FC3699F1C}"/>
+          </ac:picMkLst>
+        </pc:picChg>
+        <pc:picChg chg="mod">
+          <ac:chgData name="Khitalishvili, Koba" userId="c02c2335-1b21-4459-93e3-a2125e4631b1" providerId="ADAL" clId="{CD1204E6-FD34-478A-94B4-F7EB36BAC6C8}" dt="2024-11-18T19:14:38.387" v="220"/>
+          <ac:picMkLst>
+            <pc:docMk/>
+            <pc:sldMk cId="1378656094" sldId="258"/>
+            <ac:picMk id="1038" creationId="{4D517ABE-39DA-174B-AF0A-10B77CF311D8}"/>
+          </ac:picMkLst>
+        </pc:picChg>
+        <pc:picChg chg="mod">
+          <ac:chgData name="Khitalishvili, Koba" userId="c02c2335-1b21-4459-93e3-a2125e4631b1" providerId="ADAL" clId="{CD1204E6-FD34-478A-94B4-F7EB36BAC6C8}" dt="2024-11-18T19:14:38.387" v="220"/>
+          <ac:picMkLst>
+            <pc:docMk/>
+            <pc:sldMk cId="1378656094" sldId="258"/>
+            <ac:picMk id="1040" creationId="{74B9BCDB-320F-6F26-BADA-B4BA555D53F7}"/>
+          </ac:picMkLst>
+        </pc:picChg>
+        <pc:picChg chg="mod">
+          <ac:chgData name="Khitalishvili, Koba" userId="c02c2335-1b21-4459-93e3-a2125e4631b1" providerId="ADAL" clId="{CD1204E6-FD34-478A-94B4-F7EB36BAC6C8}" dt="2024-11-18T19:14:38.387" v="220"/>
+          <ac:picMkLst>
+            <pc:docMk/>
+            <pc:sldMk cId="1378656094" sldId="258"/>
+            <ac:picMk id="1042" creationId="{A8814840-89F6-595C-846A-2A0ADCC71953}"/>
+          </ac:picMkLst>
+        </pc:picChg>
+        <pc:cxnChg chg="mod">
+          <ac:chgData name="Khitalishvili, Koba" userId="c02c2335-1b21-4459-93e3-a2125e4631b1" providerId="ADAL" clId="{CD1204E6-FD34-478A-94B4-F7EB36BAC6C8}" dt="2024-11-18T19:14:38.387" v="220"/>
+          <ac:cxnSpMkLst>
+            <pc:docMk/>
+            <pc:sldMk cId="1378656094" sldId="258"/>
+            <ac:cxnSpMk id="12" creationId="{CE871203-83BE-46CC-EAB5-6FF9597FEA32}"/>
+          </ac:cxnSpMkLst>
+        </pc:cxnChg>
+      </pc:sldChg>
+      <pc:sldChg chg="addSp delSp modSp add mod setBg">
+        <pc:chgData name="Khitalishvili, Koba" userId="c02c2335-1b21-4459-93e3-a2125e4631b1" providerId="ADAL" clId="{CD1204E6-FD34-478A-94B4-F7EB36BAC6C8}" dt="2024-11-18T19:36:23.106" v="222"/>
+        <pc:sldMkLst>
+          <pc:docMk/>
+          <pc:sldMk cId="1169629662" sldId="259"/>
+        </pc:sldMkLst>
+        <pc:spChg chg="mod">
+          <ac:chgData name="Khitalishvili, Koba" userId="c02c2335-1b21-4459-93e3-a2125e4631b1" providerId="ADAL" clId="{CD1204E6-FD34-478A-94B4-F7EB36BAC6C8}" dt="2024-11-18T19:36:23.106" v="222"/>
+          <ac:spMkLst>
+            <pc:docMk/>
+            <pc:sldMk cId="1169629662" sldId="259"/>
+            <ac:spMk id="6" creationId="{9746B6E1-57FD-E6DD-67A7-CA3969747068}"/>
+          </ac:spMkLst>
+        </pc:spChg>
+        <pc:spChg chg="mod">
+          <ac:chgData name="Khitalishvili, Koba" userId="c02c2335-1b21-4459-93e3-a2125e4631b1" providerId="ADAL" clId="{CD1204E6-FD34-478A-94B4-F7EB36BAC6C8}" dt="2024-11-18T19:36:23.106" v="222"/>
+          <ac:spMkLst>
+            <pc:docMk/>
+            <pc:sldMk cId="1169629662" sldId="259"/>
+            <ac:spMk id="7" creationId="{4D897325-BC50-79C1-8726-F77CCBDF9FFB}"/>
+          </ac:spMkLst>
+        </pc:spChg>
+        <pc:spChg chg="mod">
+          <ac:chgData name="Khitalishvili, Koba" userId="c02c2335-1b21-4459-93e3-a2125e4631b1" providerId="ADAL" clId="{CD1204E6-FD34-478A-94B4-F7EB36BAC6C8}" dt="2024-11-18T19:36:23.106" v="222"/>
+          <ac:spMkLst>
+            <pc:docMk/>
+            <pc:sldMk cId="1169629662" sldId="259"/>
+            <ac:spMk id="8" creationId="{24417EC7-7555-7606-8FCB-345BBBF1F3D4}"/>
+          </ac:spMkLst>
+        </pc:spChg>
+        <pc:spChg chg="mod">
+          <ac:chgData name="Khitalishvili, Koba" userId="c02c2335-1b21-4459-93e3-a2125e4631b1" providerId="ADAL" clId="{CD1204E6-FD34-478A-94B4-F7EB36BAC6C8}" dt="2024-11-18T19:36:23.106" v="222"/>
+          <ac:spMkLst>
+            <pc:docMk/>
+            <pc:sldMk cId="1169629662" sldId="259"/>
+            <ac:spMk id="9" creationId="{355F2020-3D35-32BF-4540-C4C04F2E4E74}"/>
+          </ac:spMkLst>
+        </pc:spChg>
+        <pc:spChg chg="mod">
+          <ac:chgData name="Khitalishvili, Koba" userId="c02c2335-1b21-4459-93e3-a2125e4631b1" providerId="ADAL" clId="{CD1204E6-FD34-478A-94B4-F7EB36BAC6C8}" dt="2024-11-18T19:36:23.106" v="222"/>
+          <ac:spMkLst>
+            <pc:docMk/>
+            <pc:sldMk cId="1169629662" sldId="259"/>
+            <ac:spMk id="10" creationId="{021BBFD7-1D8D-CAD6-BD1D-9639C47E1198}"/>
+          </ac:spMkLst>
+        </pc:spChg>
+        <pc:spChg chg="mod">
+          <ac:chgData name="Khitalishvili, Koba" userId="c02c2335-1b21-4459-93e3-a2125e4631b1" providerId="ADAL" clId="{CD1204E6-FD34-478A-94B4-F7EB36BAC6C8}" dt="2024-11-18T19:36:23.106" v="222"/>
+          <ac:spMkLst>
+            <pc:docMk/>
+            <pc:sldMk cId="1169629662" sldId="259"/>
+            <ac:spMk id="14" creationId="{233E8355-9EC3-299D-CFE3-9DCE69D10474}"/>
+          </ac:spMkLst>
+        </pc:spChg>
+        <pc:spChg chg="mod">
+          <ac:chgData name="Khitalishvili, Koba" userId="c02c2335-1b21-4459-93e3-a2125e4631b1" providerId="ADAL" clId="{CD1204E6-FD34-478A-94B4-F7EB36BAC6C8}" dt="2024-11-18T19:36:23.106" v="222"/>
+          <ac:spMkLst>
+            <pc:docMk/>
+            <pc:sldMk cId="1169629662" sldId="259"/>
+            <ac:spMk id="16" creationId="{EF11BBC3-C052-C330-56D4-2DA740DD5E9D}"/>
+          </ac:spMkLst>
+        </pc:spChg>
+        <pc:spChg chg="mod">
+          <ac:chgData name="Khitalishvili, Koba" userId="c02c2335-1b21-4459-93e3-a2125e4631b1" providerId="ADAL" clId="{CD1204E6-FD34-478A-94B4-F7EB36BAC6C8}" dt="2024-11-18T19:36:23.106" v="222"/>
+          <ac:spMkLst>
+            <pc:docMk/>
+            <pc:sldMk cId="1169629662" sldId="259"/>
+            <ac:spMk id="18" creationId="{CB7D104E-C82B-2B7B-0B41-DDB437FDD6F1}"/>
+          </ac:spMkLst>
+        </pc:spChg>
+        <pc:spChg chg="mod">
+          <ac:chgData name="Khitalishvili, Koba" userId="c02c2335-1b21-4459-93e3-a2125e4631b1" providerId="ADAL" clId="{CD1204E6-FD34-478A-94B4-F7EB36BAC6C8}" dt="2024-11-18T19:36:23.106" v="222"/>
+          <ac:spMkLst>
+            <pc:docMk/>
+            <pc:sldMk cId="1169629662" sldId="259"/>
+            <ac:spMk id="27" creationId="{A424C7FD-454F-2D07-B56A-32E11BC67086}"/>
+          </ac:spMkLst>
+        </pc:spChg>
+        <pc:spChg chg="mod">
+          <ac:chgData name="Khitalishvili, Koba" userId="c02c2335-1b21-4459-93e3-a2125e4631b1" providerId="ADAL" clId="{CD1204E6-FD34-478A-94B4-F7EB36BAC6C8}" dt="2024-11-18T19:36:23.106" v="222"/>
+          <ac:spMkLst>
+            <pc:docMk/>
+            <pc:sldMk cId="1169629662" sldId="259"/>
+            <ac:spMk id="29" creationId="{C034CBFE-317E-67B2-A55E-1004283B1F87}"/>
+          </ac:spMkLst>
+        </pc:spChg>
+        <pc:spChg chg="mod">
+          <ac:chgData name="Khitalishvili, Koba" userId="c02c2335-1b21-4459-93e3-a2125e4631b1" providerId="ADAL" clId="{CD1204E6-FD34-478A-94B4-F7EB36BAC6C8}" dt="2024-11-18T19:36:23.106" v="222"/>
+          <ac:spMkLst>
+            <pc:docMk/>
+            <pc:sldMk cId="1169629662" sldId="259"/>
+            <ac:spMk id="30" creationId="{7B4697EF-3261-062A-45DA-30FE9506C3B2}"/>
+          </ac:spMkLst>
+        </pc:spChg>
+        <pc:spChg chg="add mod">
+          <ac:chgData name="Khitalishvili, Koba" userId="c02c2335-1b21-4459-93e3-a2125e4631b1" providerId="ADAL" clId="{CD1204E6-FD34-478A-94B4-F7EB36BAC6C8}" dt="2024-11-18T19:36:23.106" v="222"/>
+          <ac:spMkLst>
+            <pc:docMk/>
+            <pc:sldMk cId="1169629662" sldId="259"/>
+            <ac:spMk id="34" creationId="{EF80AF4B-902D-B20C-1437-B35AEB01C919}"/>
+          </ac:spMkLst>
+        </pc:spChg>
+        <pc:picChg chg="add mod ord">
+          <ac:chgData name="Khitalishvili, Koba" userId="c02c2335-1b21-4459-93e3-a2125e4631b1" providerId="ADAL" clId="{CD1204E6-FD34-478A-94B4-F7EB36BAC6C8}" dt="2024-11-18T19:36:23.106" v="222"/>
+          <ac:picMkLst>
+            <pc:docMk/>
+            <pc:sldMk cId="1169629662" sldId="259"/>
+            <ac:picMk id="3" creationId="{C5C4DDC0-2365-DDE6-A0BF-76D263BF5FF8}"/>
+          </ac:picMkLst>
+        </pc:picChg>
+        <pc:picChg chg="del">
+          <ac:chgData name="Khitalishvili, Koba" userId="c02c2335-1b21-4459-93e3-a2125e4631b1" providerId="ADAL" clId="{CD1204E6-FD34-478A-94B4-F7EB36BAC6C8}" dt="2024-11-18T18:49:24.539" v="3" actId="478"/>
+          <ac:picMkLst>
+            <pc:docMk/>
+            <pc:sldMk cId="1169629662" sldId="259"/>
+            <ac:picMk id="5" creationId="{24413B47-00F2-BC41-4DDF-6566CFB1BA84}"/>
+          </ac:picMkLst>
+        </pc:picChg>
+        <pc:picChg chg="mod">
+          <ac:chgData name="Khitalishvili, Koba" userId="c02c2335-1b21-4459-93e3-a2125e4631b1" providerId="ADAL" clId="{CD1204E6-FD34-478A-94B4-F7EB36BAC6C8}" dt="2024-11-18T19:36:23.106" v="222"/>
+          <ac:picMkLst>
+            <pc:docMk/>
+            <pc:sldMk cId="1169629662" sldId="259"/>
+            <ac:picMk id="26" creationId="{B236DC1F-1E88-067B-6504-B00FE7683649}"/>
+          </ac:picMkLst>
+        </pc:picChg>
+        <pc:picChg chg="add mod">
+          <ac:chgData name="Khitalishvili, Koba" userId="c02c2335-1b21-4459-93e3-a2125e4631b1" providerId="ADAL" clId="{CD1204E6-FD34-478A-94B4-F7EB36BAC6C8}" dt="2024-11-18T19:36:23.106" v="222"/>
+          <ac:picMkLst>
+            <pc:docMk/>
+            <pc:sldMk cId="1169629662" sldId="259"/>
+            <ac:picMk id="33" creationId="{618E496F-FD92-CB6F-D193-FB232A72DF71}"/>
+          </ac:picMkLst>
+        </pc:picChg>
+        <pc:picChg chg="mod">
+          <ac:chgData name="Khitalishvili, Koba" userId="c02c2335-1b21-4459-93e3-a2125e4631b1" providerId="ADAL" clId="{CD1204E6-FD34-478A-94B4-F7EB36BAC6C8}" dt="2024-11-18T19:36:23.106" v="222"/>
+          <ac:picMkLst>
+            <pc:docMk/>
+            <pc:sldMk cId="1169629662" sldId="259"/>
+            <ac:picMk id="1026" creationId="{BDC8E5D0-7FAC-97BF-5A3E-C4CF3130F9C8}"/>
+          </ac:picMkLst>
+        </pc:picChg>
+        <pc:picChg chg="mod">
+          <ac:chgData name="Khitalishvili, Koba" userId="c02c2335-1b21-4459-93e3-a2125e4631b1" providerId="ADAL" clId="{CD1204E6-FD34-478A-94B4-F7EB36BAC6C8}" dt="2024-11-18T19:36:23.106" v="222"/>
+          <ac:picMkLst>
+            <pc:docMk/>
+            <pc:sldMk cId="1169629662" sldId="259"/>
+            <ac:picMk id="1032" creationId="{B58E136A-3C1C-0E1C-4839-167CB7A3401F}"/>
+          </ac:picMkLst>
+        </pc:picChg>
+        <pc:picChg chg="mod">
+          <ac:chgData name="Khitalishvili, Koba" userId="c02c2335-1b21-4459-93e3-a2125e4631b1" providerId="ADAL" clId="{CD1204E6-FD34-478A-94B4-F7EB36BAC6C8}" dt="2024-11-18T19:36:23.106" v="222"/>
+          <ac:picMkLst>
+            <pc:docMk/>
+            <pc:sldMk cId="1169629662" sldId="259"/>
+            <ac:picMk id="1034" creationId="{8E25DE64-AA68-8A57-6976-B032DCF772CA}"/>
+          </ac:picMkLst>
+        </pc:picChg>
+        <pc:picChg chg="mod">
+          <ac:chgData name="Khitalishvili, Koba" userId="c02c2335-1b21-4459-93e3-a2125e4631b1" providerId="ADAL" clId="{CD1204E6-FD34-478A-94B4-F7EB36BAC6C8}" dt="2024-11-18T19:36:23.106" v="222"/>
+          <ac:picMkLst>
+            <pc:docMk/>
+            <pc:sldMk cId="1169629662" sldId="259"/>
+            <ac:picMk id="1036" creationId="{613D81A8-4A77-B755-740B-FC7FC3699F1C}"/>
+          </ac:picMkLst>
+        </pc:picChg>
+        <pc:picChg chg="mod">
+          <ac:chgData name="Khitalishvili, Koba" userId="c02c2335-1b21-4459-93e3-a2125e4631b1" providerId="ADAL" clId="{CD1204E6-FD34-478A-94B4-F7EB36BAC6C8}" dt="2024-11-18T19:36:23.106" v="222"/>
+          <ac:picMkLst>
+            <pc:docMk/>
+            <pc:sldMk cId="1169629662" sldId="259"/>
+            <ac:picMk id="1038" creationId="{4D517ABE-39DA-174B-AF0A-10B77CF311D8}"/>
+          </ac:picMkLst>
+        </pc:picChg>
+        <pc:picChg chg="mod">
+          <ac:chgData name="Khitalishvili, Koba" userId="c02c2335-1b21-4459-93e3-a2125e4631b1" providerId="ADAL" clId="{CD1204E6-FD34-478A-94B4-F7EB36BAC6C8}" dt="2024-11-18T19:36:23.106" v="222"/>
+          <ac:picMkLst>
+            <pc:docMk/>
+            <pc:sldMk cId="1169629662" sldId="259"/>
+            <ac:picMk id="1040" creationId="{74B9BCDB-320F-6F26-BADA-B4BA555D53F7}"/>
+          </ac:picMkLst>
+        </pc:picChg>
+        <pc:picChg chg="mod">
+          <ac:chgData name="Khitalishvili, Koba" userId="c02c2335-1b21-4459-93e3-a2125e4631b1" providerId="ADAL" clId="{CD1204E6-FD34-478A-94B4-F7EB36BAC6C8}" dt="2024-11-18T19:36:23.106" v="222"/>
+          <ac:picMkLst>
+            <pc:docMk/>
+            <pc:sldMk cId="1169629662" sldId="259"/>
+            <ac:picMk id="1042" creationId="{A8814840-89F6-595C-846A-2A0ADCC71953}"/>
+          </ac:picMkLst>
+        </pc:picChg>
+        <pc:cxnChg chg="add mod">
+          <ac:chgData name="Khitalishvili, Koba" userId="c02c2335-1b21-4459-93e3-a2125e4631b1" providerId="ADAL" clId="{CD1204E6-FD34-478A-94B4-F7EB36BAC6C8}" dt="2024-11-18T19:36:23.106" v="222"/>
+          <ac:cxnSpMkLst>
+            <pc:docMk/>
+            <pc:sldMk cId="1169629662" sldId="259"/>
+            <ac:cxnSpMk id="4" creationId="{3E57B7E7-7622-98AC-5B61-5D9A12EF0774}"/>
+          </ac:cxnSpMkLst>
+        </pc:cxnChg>
+        <pc:cxnChg chg="add del mod">
+          <ac:chgData name="Khitalishvili, Koba" userId="c02c2335-1b21-4459-93e3-a2125e4631b1" providerId="ADAL" clId="{CD1204E6-FD34-478A-94B4-F7EB36BAC6C8}" dt="2024-11-18T19:36:23.106" v="222"/>
+          <ac:cxnSpMkLst>
+            <pc:docMk/>
+            <pc:sldMk cId="1169629662" sldId="259"/>
+            <ac:cxnSpMk id="12" creationId="{CE871203-83BE-46CC-EAB5-6FF9597FEA32}"/>
+          </ac:cxnSpMkLst>
+        </pc:cxnChg>
+        <pc:cxnChg chg="add mod">
+          <ac:chgData name="Khitalishvili, Koba" userId="c02c2335-1b21-4459-93e3-a2125e4631b1" providerId="ADAL" clId="{CD1204E6-FD34-478A-94B4-F7EB36BAC6C8}" dt="2024-11-18T19:36:23.106" v="222"/>
+          <ac:cxnSpMkLst>
+            <pc:docMk/>
+            <pc:sldMk cId="1169629662" sldId="259"/>
+            <ac:cxnSpMk id="23" creationId="{322B4B57-3D1A-501E-407B-1C19F1ED216E}"/>
+          </ac:cxnSpMkLst>
+        </pc:cxnChg>
+      </pc:sldChg>
+      <pc:sldMasterChg chg="modSp modSldLayout">
+        <pc:chgData name="Khitalishvili, Koba" userId="c02c2335-1b21-4459-93e3-a2125e4631b1" providerId="ADAL" clId="{CD1204E6-FD34-478A-94B4-F7EB36BAC6C8}" dt="2024-11-18T19:14:38.387" v="220"/>
+        <pc:sldMasterMkLst>
+          <pc:docMk/>
+          <pc:sldMasterMk cId="2353312228" sldId="2147483660"/>
+        </pc:sldMasterMkLst>
+        <pc:spChg chg="mod">
+          <ac:chgData name="Khitalishvili, Koba" userId="c02c2335-1b21-4459-93e3-a2125e4631b1" providerId="ADAL" clId="{CD1204E6-FD34-478A-94B4-F7EB36BAC6C8}" dt="2024-11-18T19:14:38.387" v="220"/>
+          <ac:spMkLst>
+            <pc:docMk/>
+            <pc:sldMasterMk cId="2353312228" sldId="2147483660"/>
+            <ac:spMk id="2" creationId="{00000000-0000-0000-0000-000000000000}"/>
+          </ac:spMkLst>
+        </pc:spChg>
+        <pc:spChg chg="mod">
+          <ac:chgData name="Khitalishvili, Koba" userId="c02c2335-1b21-4459-93e3-a2125e4631b1" providerId="ADAL" clId="{CD1204E6-FD34-478A-94B4-F7EB36BAC6C8}" dt="2024-11-18T19:14:38.387" v="220"/>
+          <ac:spMkLst>
+            <pc:docMk/>
+            <pc:sldMasterMk cId="2353312228" sldId="2147483660"/>
+            <ac:spMk id="3" creationId="{00000000-0000-0000-0000-000000000000}"/>
+          </ac:spMkLst>
+        </pc:spChg>
+        <pc:spChg chg="mod">
+          <ac:chgData name="Khitalishvili, Koba" userId="c02c2335-1b21-4459-93e3-a2125e4631b1" providerId="ADAL" clId="{CD1204E6-FD34-478A-94B4-F7EB36BAC6C8}" dt="2024-11-18T19:14:38.387" v="220"/>
+          <ac:spMkLst>
+            <pc:docMk/>
+            <pc:sldMasterMk cId="2353312228" sldId="2147483660"/>
+            <ac:spMk id="4" creationId="{00000000-0000-0000-0000-000000000000}"/>
+          </ac:spMkLst>
+        </pc:spChg>
+        <pc:spChg chg="mod">
+          <ac:chgData name="Khitalishvili, Koba" userId="c02c2335-1b21-4459-93e3-a2125e4631b1" providerId="ADAL" clId="{CD1204E6-FD34-478A-94B4-F7EB36BAC6C8}" dt="2024-11-18T19:14:38.387" v="220"/>
+          <ac:spMkLst>
+            <pc:docMk/>
+            <pc:sldMasterMk cId="2353312228" sldId="2147483660"/>
+            <ac:spMk id="5" creationId="{00000000-0000-0000-0000-000000000000}"/>
+          </ac:spMkLst>
+        </pc:spChg>
+        <pc:spChg chg="mod">
+          <ac:chgData name="Khitalishvili, Koba" userId="c02c2335-1b21-4459-93e3-a2125e4631b1" providerId="ADAL" clId="{CD1204E6-FD34-478A-94B4-F7EB36BAC6C8}" dt="2024-11-18T19:14:38.387" v="220"/>
+          <ac:spMkLst>
+            <pc:docMk/>
+            <pc:sldMasterMk cId="2353312228" sldId="2147483660"/>
+            <ac:spMk id="6" creationId="{00000000-0000-0000-0000-000000000000}"/>
+          </ac:spMkLst>
+        </pc:spChg>
+        <pc:sldLayoutChg chg="modSp">
+          <pc:chgData name="Khitalishvili, Koba" userId="c02c2335-1b21-4459-93e3-a2125e4631b1" providerId="ADAL" clId="{CD1204E6-FD34-478A-94B4-F7EB36BAC6C8}" dt="2024-11-18T19:14:38.387" v="220"/>
+          <pc:sldLayoutMkLst>
+            <pc:docMk/>
+            <pc:sldMasterMk cId="2353312228" sldId="2147483660"/>
+            <pc:sldLayoutMk cId="4132962695" sldId="2147483661"/>
+          </pc:sldLayoutMkLst>
+          <pc:spChg chg="mod">
+            <ac:chgData name="Khitalishvili, Koba" userId="c02c2335-1b21-4459-93e3-a2125e4631b1" providerId="ADAL" clId="{CD1204E6-FD34-478A-94B4-F7EB36BAC6C8}" dt="2024-11-18T19:14:38.387" v="220"/>
+            <ac:spMkLst>
+              <pc:docMk/>
+              <pc:sldMasterMk cId="2353312228" sldId="2147483660"/>
+              <pc:sldLayoutMk cId="4132962695" sldId="2147483661"/>
+              <ac:spMk id="2" creationId="{00000000-0000-0000-0000-000000000000}"/>
+            </ac:spMkLst>
+          </pc:spChg>
+          <pc:spChg chg="mod">
+            <ac:chgData name="Khitalishvili, Koba" userId="c02c2335-1b21-4459-93e3-a2125e4631b1" providerId="ADAL" clId="{CD1204E6-FD34-478A-94B4-F7EB36BAC6C8}" dt="2024-11-18T19:14:38.387" v="220"/>
+            <ac:spMkLst>
+              <pc:docMk/>
+              <pc:sldMasterMk cId="2353312228" sldId="2147483660"/>
+              <pc:sldLayoutMk cId="4132962695" sldId="2147483661"/>
+              <ac:spMk id="3" creationId="{00000000-0000-0000-0000-000000000000}"/>
+            </ac:spMkLst>
+          </pc:spChg>
+        </pc:sldLayoutChg>
+        <pc:sldLayoutChg chg="modSp">
+          <pc:chgData name="Khitalishvili, Koba" userId="c02c2335-1b21-4459-93e3-a2125e4631b1" providerId="ADAL" clId="{CD1204E6-FD34-478A-94B4-F7EB36BAC6C8}" dt="2024-11-18T19:14:38.387" v="220"/>
+          <pc:sldLayoutMkLst>
+            <pc:docMk/>
+            <pc:sldMasterMk cId="2353312228" sldId="2147483660"/>
+            <pc:sldLayoutMk cId="3456582653" sldId="2147483663"/>
+          </pc:sldLayoutMkLst>
+          <pc:spChg chg="mod">
+            <ac:chgData name="Khitalishvili, Koba" userId="c02c2335-1b21-4459-93e3-a2125e4631b1" providerId="ADAL" clId="{CD1204E6-FD34-478A-94B4-F7EB36BAC6C8}" dt="2024-11-18T19:14:38.387" v="220"/>
+            <ac:spMkLst>
+              <pc:docMk/>
+              <pc:sldMasterMk cId="2353312228" sldId="2147483660"/>
+              <pc:sldLayoutMk cId="3456582653" sldId="2147483663"/>
+              <ac:spMk id="2" creationId="{00000000-0000-0000-0000-000000000000}"/>
+            </ac:spMkLst>
+          </pc:spChg>
+          <pc:spChg chg="mod">
+            <ac:chgData name="Khitalishvili, Koba" userId="c02c2335-1b21-4459-93e3-a2125e4631b1" providerId="ADAL" clId="{CD1204E6-FD34-478A-94B4-F7EB36BAC6C8}" dt="2024-11-18T19:14:38.387" v="220"/>
+            <ac:spMkLst>
+              <pc:docMk/>
+              <pc:sldMasterMk cId="2353312228" sldId="2147483660"/>
+              <pc:sldLayoutMk cId="3456582653" sldId="2147483663"/>
+              <ac:spMk id="3" creationId="{00000000-0000-0000-0000-000000000000}"/>
+            </ac:spMkLst>
+          </pc:spChg>
+        </pc:sldLayoutChg>
+        <pc:sldLayoutChg chg="modSp">
+          <pc:chgData name="Khitalishvili, Koba" userId="c02c2335-1b21-4459-93e3-a2125e4631b1" providerId="ADAL" clId="{CD1204E6-FD34-478A-94B4-F7EB36BAC6C8}" dt="2024-11-18T19:14:38.387" v="220"/>
+          <pc:sldLayoutMkLst>
+            <pc:docMk/>
+            <pc:sldMasterMk cId="2353312228" sldId="2147483660"/>
+            <pc:sldLayoutMk cId="1812917617" sldId="2147483664"/>
+          </pc:sldLayoutMkLst>
+          <pc:spChg chg="mod">
+            <ac:chgData name="Khitalishvili, Koba" userId="c02c2335-1b21-4459-93e3-a2125e4631b1" providerId="ADAL" clId="{CD1204E6-FD34-478A-94B4-F7EB36BAC6C8}" dt="2024-11-18T19:14:38.387" v="220"/>
+            <ac:spMkLst>
+              <pc:docMk/>
+              <pc:sldMasterMk cId="2353312228" sldId="2147483660"/>
+              <pc:sldLayoutMk cId="1812917617" sldId="2147483664"/>
+              <ac:spMk id="3" creationId="{00000000-0000-0000-0000-000000000000}"/>
+            </ac:spMkLst>
+          </pc:spChg>
+          <pc:spChg chg="mod">
+            <ac:chgData name="Khitalishvili, Koba" userId="c02c2335-1b21-4459-93e3-a2125e4631b1" providerId="ADAL" clId="{CD1204E6-FD34-478A-94B4-F7EB36BAC6C8}" dt="2024-11-18T19:14:38.387" v="220"/>
+            <ac:spMkLst>
+              <pc:docMk/>
+              <pc:sldMasterMk cId="2353312228" sldId="2147483660"/>
+              <pc:sldLayoutMk cId="1812917617" sldId="2147483664"/>
+              <ac:spMk id="4" creationId="{00000000-0000-0000-0000-000000000000}"/>
+            </ac:spMkLst>
+          </pc:spChg>
+        </pc:sldLayoutChg>
+        <pc:sldLayoutChg chg="modSp">
+          <pc:chgData name="Khitalishvili, Koba" userId="c02c2335-1b21-4459-93e3-a2125e4631b1" providerId="ADAL" clId="{CD1204E6-FD34-478A-94B4-F7EB36BAC6C8}" dt="2024-11-18T19:14:38.387" v="220"/>
+          <pc:sldLayoutMkLst>
+            <pc:docMk/>
+            <pc:sldMasterMk cId="2353312228" sldId="2147483660"/>
+            <pc:sldLayoutMk cId="152299624" sldId="2147483665"/>
+          </pc:sldLayoutMkLst>
+          <pc:spChg chg="mod">
+            <ac:chgData name="Khitalishvili, Koba" userId="c02c2335-1b21-4459-93e3-a2125e4631b1" providerId="ADAL" clId="{CD1204E6-FD34-478A-94B4-F7EB36BAC6C8}" dt="2024-11-18T19:14:38.387" v="220"/>
+            <ac:spMkLst>
+              <pc:docMk/>
+              <pc:sldMasterMk cId="2353312228" sldId="2147483660"/>
+              <pc:sldLayoutMk cId="152299624" sldId="2147483665"/>
+              <ac:spMk id="2" creationId="{00000000-0000-0000-0000-000000000000}"/>
+            </ac:spMkLst>
+          </pc:spChg>
+          <pc:spChg chg="mod">
+            <ac:chgData name="Khitalishvili, Koba" userId="c02c2335-1b21-4459-93e3-a2125e4631b1" providerId="ADAL" clId="{CD1204E6-FD34-478A-94B4-F7EB36BAC6C8}" dt="2024-11-18T19:14:38.387" v="220"/>
+            <ac:spMkLst>
+              <pc:docMk/>
+              <pc:sldMasterMk cId="2353312228" sldId="2147483660"/>
+              <pc:sldLayoutMk cId="152299624" sldId="2147483665"/>
+              <ac:spMk id="3" creationId="{00000000-0000-0000-0000-000000000000}"/>
+            </ac:spMkLst>
+          </pc:spChg>
+          <pc:spChg chg="mod">
+            <ac:chgData name="Khitalishvili, Koba" userId="c02c2335-1b21-4459-93e3-a2125e4631b1" providerId="ADAL" clId="{CD1204E6-FD34-478A-94B4-F7EB36BAC6C8}" dt="2024-11-18T19:14:38.387" v="220"/>
+            <ac:spMkLst>
+              <pc:docMk/>
+              <pc:sldMasterMk cId="2353312228" sldId="2147483660"/>
+              <pc:sldLayoutMk cId="152299624" sldId="2147483665"/>
+              <ac:spMk id="4" creationId="{00000000-0000-0000-0000-000000000000}"/>
+            </ac:spMkLst>
+          </pc:spChg>
+          <pc:spChg chg="mod">
+            <ac:chgData name="Khitalishvili, Koba" userId="c02c2335-1b21-4459-93e3-a2125e4631b1" providerId="ADAL" clId="{CD1204E6-FD34-478A-94B4-F7EB36BAC6C8}" dt="2024-11-18T19:14:38.387" v="220"/>
+            <ac:spMkLst>
+              <pc:docMk/>
+              <pc:sldMasterMk cId="2353312228" sldId="2147483660"/>
+              <pc:sldLayoutMk cId="152299624" sldId="2147483665"/>
+              <ac:spMk id="5" creationId="{00000000-0000-0000-0000-000000000000}"/>
+            </ac:spMkLst>
+          </pc:spChg>
+          <pc:spChg chg="mod">
+            <ac:chgData name="Khitalishvili, Koba" userId="c02c2335-1b21-4459-93e3-a2125e4631b1" providerId="ADAL" clId="{CD1204E6-FD34-478A-94B4-F7EB36BAC6C8}" dt="2024-11-18T19:14:38.387" v="220"/>
+            <ac:spMkLst>
+              <pc:docMk/>
+              <pc:sldMasterMk cId="2353312228" sldId="2147483660"/>
+              <pc:sldLayoutMk cId="152299624" sldId="2147483665"/>
+              <ac:spMk id="6" creationId="{00000000-0000-0000-0000-000000000000}"/>
+            </ac:spMkLst>
+          </pc:spChg>
+        </pc:sldLayoutChg>
+        <pc:sldLayoutChg chg="modSp">
+          <pc:chgData name="Khitalishvili, Koba" userId="c02c2335-1b21-4459-93e3-a2125e4631b1" providerId="ADAL" clId="{CD1204E6-FD34-478A-94B4-F7EB36BAC6C8}" dt="2024-11-18T19:14:38.387" v="220"/>
+          <pc:sldLayoutMkLst>
+            <pc:docMk/>
+            <pc:sldMasterMk cId="2353312228" sldId="2147483660"/>
+            <pc:sldLayoutMk cId="2330909102" sldId="2147483668"/>
+          </pc:sldLayoutMkLst>
+          <pc:spChg chg="mod">
+            <ac:chgData name="Khitalishvili, Koba" userId="c02c2335-1b21-4459-93e3-a2125e4631b1" providerId="ADAL" clId="{CD1204E6-FD34-478A-94B4-F7EB36BAC6C8}" dt="2024-11-18T19:14:38.387" v="220"/>
+            <ac:spMkLst>
+              <pc:docMk/>
+              <pc:sldMasterMk cId="2353312228" sldId="2147483660"/>
+              <pc:sldLayoutMk cId="2330909102" sldId="2147483668"/>
+              <ac:spMk id="2" creationId="{00000000-0000-0000-0000-000000000000}"/>
+            </ac:spMkLst>
+          </pc:spChg>
+          <pc:spChg chg="mod">
+            <ac:chgData name="Khitalishvili, Koba" userId="c02c2335-1b21-4459-93e3-a2125e4631b1" providerId="ADAL" clId="{CD1204E6-FD34-478A-94B4-F7EB36BAC6C8}" dt="2024-11-18T19:14:38.387" v="220"/>
+            <ac:spMkLst>
+              <pc:docMk/>
+              <pc:sldMasterMk cId="2353312228" sldId="2147483660"/>
+              <pc:sldLayoutMk cId="2330909102" sldId="2147483668"/>
+              <ac:spMk id="3" creationId="{00000000-0000-0000-0000-000000000000}"/>
+            </ac:spMkLst>
+          </pc:spChg>
+          <pc:spChg chg="mod">
+            <ac:chgData name="Khitalishvili, Koba" userId="c02c2335-1b21-4459-93e3-a2125e4631b1" providerId="ADAL" clId="{CD1204E6-FD34-478A-94B4-F7EB36BAC6C8}" dt="2024-11-18T19:14:38.387" v="220"/>
+            <ac:spMkLst>
+              <pc:docMk/>
+              <pc:sldMasterMk cId="2353312228" sldId="2147483660"/>
+              <pc:sldLayoutMk cId="2330909102" sldId="2147483668"/>
+              <ac:spMk id="4" creationId="{00000000-0000-0000-0000-000000000000}"/>
+            </ac:spMkLst>
+          </pc:spChg>
+        </pc:sldLayoutChg>
+        <pc:sldLayoutChg chg="modSp">
+          <pc:chgData name="Khitalishvili, Koba" userId="c02c2335-1b21-4459-93e3-a2125e4631b1" providerId="ADAL" clId="{CD1204E6-FD34-478A-94B4-F7EB36BAC6C8}" dt="2024-11-18T19:14:38.387" v="220"/>
+          <pc:sldLayoutMkLst>
+            <pc:docMk/>
+            <pc:sldMasterMk cId="2353312228" sldId="2147483660"/>
+            <pc:sldLayoutMk cId="268978110" sldId="2147483669"/>
+          </pc:sldLayoutMkLst>
+          <pc:spChg chg="mod">
+            <ac:chgData name="Khitalishvili, Koba" userId="c02c2335-1b21-4459-93e3-a2125e4631b1" providerId="ADAL" clId="{CD1204E6-FD34-478A-94B4-F7EB36BAC6C8}" dt="2024-11-18T19:14:38.387" v="220"/>
+            <ac:spMkLst>
+              <pc:docMk/>
+              <pc:sldMasterMk cId="2353312228" sldId="2147483660"/>
+              <pc:sldLayoutMk cId="268978110" sldId="2147483669"/>
+              <ac:spMk id="2" creationId="{00000000-0000-0000-0000-000000000000}"/>
+            </ac:spMkLst>
+          </pc:spChg>
+          <pc:spChg chg="mod">
+            <ac:chgData name="Khitalishvili, Koba" userId="c02c2335-1b21-4459-93e3-a2125e4631b1" providerId="ADAL" clId="{CD1204E6-FD34-478A-94B4-F7EB36BAC6C8}" dt="2024-11-18T19:14:38.387" v="220"/>
+            <ac:spMkLst>
+              <pc:docMk/>
+              <pc:sldMasterMk cId="2353312228" sldId="2147483660"/>
+              <pc:sldLayoutMk cId="268978110" sldId="2147483669"/>
+              <ac:spMk id="3" creationId="{00000000-0000-0000-0000-000000000000}"/>
+            </ac:spMkLst>
+          </pc:spChg>
+          <pc:spChg chg="mod">
+            <ac:chgData name="Khitalishvili, Koba" userId="c02c2335-1b21-4459-93e3-a2125e4631b1" providerId="ADAL" clId="{CD1204E6-FD34-478A-94B4-F7EB36BAC6C8}" dt="2024-11-18T19:14:38.387" v="220"/>
+            <ac:spMkLst>
+              <pc:docMk/>
+              <pc:sldMasterMk cId="2353312228" sldId="2147483660"/>
+              <pc:sldLayoutMk cId="268978110" sldId="2147483669"/>
+              <ac:spMk id="4" creationId="{00000000-0000-0000-0000-000000000000}"/>
+            </ac:spMkLst>
+          </pc:spChg>
+        </pc:sldLayoutChg>
+        <pc:sldLayoutChg chg="modSp">
+          <pc:chgData name="Khitalishvili, Koba" userId="c02c2335-1b21-4459-93e3-a2125e4631b1" providerId="ADAL" clId="{CD1204E6-FD34-478A-94B4-F7EB36BAC6C8}" dt="2024-11-18T19:14:38.387" v="220"/>
+          <pc:sldLayoutMkLst>
+            <pc:docMk/>
+            <pc:sldMasterMk cId="2353312228" sldId="2147483660"/>
+            <pc:sldLayoutMk cId="1084632251" sldId="2147483671"/>
+          </pc:sldLayoutMkLst>
+          <pc:spChg chg="mod">
+            <ac:chgData name="Khitalishvili, Koba" userId="c02c2335-1b21-4459-93e3-a2125e4631b1" providerId="ADAL" clId="{CD1204E6-FD34-478A-94B4-F7EB36BAC6C8}" dt="2024-11-18T19:14:38.387" v="220"/>
+            <ac:spMkLst>
+              <pc:docMk/>
+              <pc:sldMasterMk cId="2353312228" sldId="2147483660"/>
+              <pc:sldLayoutMk cId="1084632251" sldId="2147483671"/>
+              <ac:spMk id="2" creationId="{00000000-0000-0000-0000-000000000000}"/>
+            </ac:spMkLst>
+          </pc:spChg>
+          <pc:spChg chg="mod">
+            <ac:chgData name="Khitalishvili, Koba" userId="c02c2335-1b21-4459-93e3-a2125e4631b1" providerId="ADAL" clId="{CD1204E6-FD34-478A-94B4-F7EB36BAC6C8}" dt="2024-11-18T19:14:38.387" v="220"/>
+            <ac:spMkLst>
+              <pc:docMk/>
+              <pc:sldMasterMk cId="2353312228" sldId="2147483660"/>
+              <pc:sldLayoutMk cId="1084632251" sldId="2147483671"/>
+              <ac:spMk id="3" creationId="{00000000-0000-0000-0000-000000000000}"/>
+            </ac:spMkLst>
+          </pc:spChg>
+        </pc:sldLayoutChg>
+      </pc:sldMasterChg>
+      <pc:sldMasterChg chg="modSp modSldLayout">
+        <pc:chgData name="Khitalishvili, Koba" userId="c02c2335-1b21-4459-93e3-a2125e4631b1" providerId="ADAL" clId="{CD1204E6-FD34-478A-94B4-F7EB36BAC6C8}" dt="2024-11-18T19:36:23.106" v="222"/>
+        <pc:sldMasterMkLst>
+          <pc:docMk/>
+          <pc:sldMasterMk cId="1350515898" sldId="2147483672"/>
+        </pc:sldMasterMkLst>
+        <pc:spChg chg="mod">
+          <ac:chgData name="Khitalishvili, Koba" userId="c02c2335-1b21-4459-93e3-a2125e4631b1" providerId="ADAL" clId="{CD1204E6-FD34-478A-94B4-F7EB36BAC6C8}" dt="2024-11-18T19:36:23.106" v="222"/>
+          <ac:spMkLst>
+            <pc:docMk/>
+            <pc:sldMasterMk cId="1350515898" sldId="2147483672"/>
+            <ac:spMk id="2" creationId="{00000000-0000-0000-0000-000000000000}"/>
+          </ac:spMkLst>
+        </pc:spChg>
+        <pc:spChg chg="mod">
+          <ac:chgData name="Khitalishvili, Koba" userId="c02c2335-1b21-4459-93e3-a2125e4631b1" providerId="ADAL" clId="{CD1204E6-FD34-478A-94B4-F7EB36BAC6C8}" dt="2024-11-18T19:36:23.106" v="222"/>
+          <ac:spMkLst>
+            <pc:docMk/>
+            <pc:sldMasterMk cId="1350515898" sldId="2147483672"/>
+            <ac:spMk id="3" creationId="{00000000-0000-0000-0000-000000000000}"/>
+          </ac:spMkLst>
+        </pc:spChg>
+        <pc:spChg chg="mod">
+          <ac:chgData name="Khitalishvili, Koba" userId="c02c2335-1b21-4459-93e3-a2125e4631b1" providerId="ADAL" clId="{CD1204E6-FD34-478A-94B4-F7EB36BAC6C8}" dt="2024-11-18T19:36:23.106" v="222"/>
+          <ac:spMkLst>
+            <pc:docMk/>
+            <pc:sldMasterMk cId="1350515898" sldId="2147483672"/>
+            <ac:spMk id="4" creationId="{00000000-0000-0000-0000-000000000000}"/>
+          </ac:spMkLst>
+        </pc:spChg>
+        <pc:spChg chg="mod">
+          <ac:chgData name="Khitalishvili, Koba" userId="c02c2335-1b21-4459-93e3-a2125e4631b1" providerId="ADAL" clId="{CD1204E6-FD34-478A-94B4-F7EB36BAC6C8}" dt="2024-11-18T19:36:23.106" v="222"/>
+          <ac:spMkLst>
+            <pc:docMk/>
+            <pc:sldMasterMk cId="1350515898" sldId="2147483672"/>
+            <ac:spMk id="5" creationId="{00000000-0000-0000-0000-000000000000}"/>
+          </ac:spMkLst>
+        </pc:spChg>
+        <pc:spChg chg="mod">
+          <ac:chgData name="Khitalishvili, Koba" userId="c02c2335-1b21-4459-93e3-a2125e4631b1" providerId="ADAL" clId="{CD1204E6-FD34-478A-94B4-F7EB36BAC6C8}" dt="2024-11-18T19:36:23.106" v="222"/>
+          <ac:spMkLst>
+            <pc:docMk/>
+            <pc:sldMasterMk cId="1350515898" sldId="2147483672"/>
+            <ac:spMk id="6" creationId="{00000000-0000-0000-0000-000000000000}"/>
+          </ac:spMkLst>
+        </pc:spChg>
+        <pc:sldLayoutChg chg="modSp">
+          <pc:chgData name="Khitalishvili, Koba" userId="c02c2335-1b21-4459-93e3-a2125e4631b1" providerId="ADAL" clId="{CD1204E6-FD34-478A-94B4-F7EB36BAC6C8}" dt="2024-11-18T19:36:23.106" v="222"/>
+          <pc:sldLayoutMkLst>
+            <pc:docMk/>
+            <pc:sldMasterMk cId="1350515898" sldId="2147483672"/>
+            <pc:sldLayoutMk cId="296811831" sldId="2147483673"/>
+          </pc:sldLayoutMkLst>
+          <pc:spChg chg="mod">
+            <ac:chgData name="Khitalishvili, Koba" userId="c02c2335-1b21-4459-93e3-a2125e4631b1" providerId="ADAL" clId="{CD1204E6-FD34-478A-94B4-F7EB36BAC6C8}" dt="2024-11-18T19:36:23.106" v="222"/>
+            <ac:spMkLst>
+              <pc:docMk/>
+              <pc:sldMasterMk cId="1350515898" sldId="2147483672"/>
+              <pc:sldLayoutMk cId="296811831" sldId="2147483673"/>
+              <ac:spMk id="2" creationId="{00000000-0000-0000-0000-000000000000}"/>
+            </ac:spMkLst>
+          </pc:spChg>
+          <pc:spChg chg="mod">
+            <ac:chgData name="Khitalishvili, Koba" userId="c02c2335-1b21-4459-93e3-a2125e4631b1" providerId="ADAL" clId="{CD1204E6-FD34-478A-94B4-F7EB36BAC6C8}" dt="2024-11-18T19:36:23.106" v="222"/>
+            <ac:spMkLst>
+              <pc:docMk/>
+              <pc:sldMasterMk cId="1350515898" sldId="2147483672"/>
+              <pc:sldLayoutMk cId="296811831" sldId="2147483673"/>
+              <ac:spMk id="3" creationId="{00000000-0000-0000-0000-000000000000}"/>
+            </ac:spMkLst>
+          </pc:spChg>
+        </pc:sldLayoutChg>
+        <pc:sldLayoutChg chg="modSp">
+          <pc:chgData name="Khitalishvili, Koba" userId="c02c2335-1b21-4459-93e3-a2125e4631b1" providerId="ADAL" clId="{CD1204E6-FD34-478A-94B4-F7EB36BAC6C8}" dt="2024-11-18T19:36:23.106" v="222"/>
+          <pc:sldLayoutMkLst>
+            <pc:docMk/>
+            <pc:sldMasterMk cId="1350515898" sldId="2147483672"/>
+            <pc:sldLayoutMk cId="3001319164" sldId="2147483675"/>
+          </pc:sldLayoutMkLst>
+          <pc:spChg chg="mod">
+            <ac:chgData name="Khitalishvili, Koba" userId="c02c2335-1b21-4459-93e3-a2125e4631b1" providerId="ADAL" clId="{CD1204E6-FD34-478A-94B4-F7EB36BAC6C8}" dt="2024-11-18T19:36:23.106" v="222"/>
+            <ac:spMkLst>
+              <pc:docMk/>
+              <pc:sldMasterMk cId="1350515898" sldId="2147483672"/>
+              <pc:sldLayoutMk cId="3001319164" sldId="2147483675"/>
+              <ac:spMk id="2" creationId="{00000000-0000-0000-0000-000000000000}"/>
+            </ac:spMkLst>
+          </pc:spChg>
+          <pc:spChg chg="mod">
+            <ac:chgData name="Khitalishvili, Koba" userId="c02c2335-1b21-4459-93e3-a2125e4631b1" providerId="ADAL" clId="{CD1204E6-FD34-478A-94B4-F7EB36BAC6C8}" dt="2024-11-18T19:36:23.106" v="222"/>
+            <ac:spMkLst>
+              <pc:docMk/>
+              <pc:sldMasterMk cId="1350515898" sldId="2147483672"/>
+              <pc:sldLayoutMk cId="3001319164" sldId="2147483675"/>
+              <ac:spMk id="3" creationId="{00000000-0000-0000-0000-000000000000}"/>
+            </ac:spMkLst>
+          </pc:spChg>
+        </pc:sldLayoutChg>
+        <pc:sldLayoutChg chg="modSp">
+          <pc:chgData name="Khitalishvili, Koba" userId="c02c2335-1b21-4459-93e3-a2125e4631b1" providerId="ADAL" clId="{CD1204E6-FD34-478A-94B4-F7EB36BAC6C8}" dt="2024-11-18T19:36:23.106" v="222"/>
+          <pc:sldLayoutMkLst>
+            <pc:docMk/>
+            <pc:sldMasterMk cId="1350515898" sldId="2147483672"/>
+            <pc:sldLayoutMk cId="3619184624" sldId="2147483676"/>
+          </pc:sldLayoutMkLst>
+          <pc:spChg chg="mod">
+            <ac:chgData name="Khitalishvili, Koba" userId="c02c2335-1b21-4459-93e3-a2125e4631b1" providerId="ADAL" clId="{CD1204E6-FD34-478A-94B4-F7EB36BAC6C8}" dt="2024-11-18T19:36:23.106" v="222"/>
+            <ac:spMkLst>
+              <pc:docMk/>
+              <pc:sldMasterMk cId="1350515898" sldId="2147483672"/>
+              <pc:sldLayoutMk cId="3619184624" sldId="2147483676"/>
+              <ac:spMk id="3" creationId="{00000000-0000-0000-0000-000000000000}"/>
+            </ac:spMkLst>
+          </pc:spChg>
+          <pc:spChg chg="mod">
+            <ac:chgData name="Khitalishvili, Koba" userId="c02c2335-1b21-4459-93e3-a2125e4631b1" providerId="ADAL" clId="{CD1204E6-FD34-478A-94B4-F7EB36BAC6C8}" dt="2024-11-18T19:36:23.106" v="222"/>
+            <ac:spMkLst>
+              <pc:docMk/>
+              <pc:sldMasterMk cId="1350515898" sldId="2147483672"/>
+              <pc:sldLayoutMk cId="3619184624" sldId="2147483676"/>
+              <ac:spMk id="4" creationId="{00000000-0000-0000-0000-000000000000}"/>
+            </ac:spMkLst>
+          </pc:spChg>
+        </pc:sldLayoutChg>
+        <pc:sldLayoutChg chg="modSp">
+          <pc:chgData name="Khitalishvili, Koba" userId="c02c2335-1b21-4459-93e3-a2125e4631b1" providerId="ADAL" clId="{CD1204E6-FD34-478A-94B4-F7EB36BAC6C8}" dt="2024-11-18T19:36:23.106" v="222"/>
+          <pc:sldLayoutMkLst>
+            <pc:docMk/>
+            <pc:sldMasterMk cId="1350515898" sldId="2147483672"/>
+            <pc:sldLayoutMk cId="988179574" sldId="2147483677"/>
+          </pc:sldLayoutMkLst>
+          <pc:spChg chg="mod">
+            <ac:chgData name="Khitalishvili, Koba" userId="c02c2335-1b21-4459-93e3-a2125e4631b1" providerId="ADAL" clId="{CD1204E6-FD34-478A-94B4-F7EB36BAC6C8}" dt="2024-11-18T19:36:23.106" v="222"/>
+            <ac:spMkLst>
+              <pc:docMk/>
+              <pc:sldMasterMk cId="1350515898" sldId="2147483672"/>
+              <pc:sldLayoutMk cId="988179574" sldId="2147483677"/>
+              <ac:spMk id="2" creationId="{00000000-0000-0000-0000-000000000000}"/>
+            </ac:spMkLst>
+          </pc:spChg>
+          <pc:spChg chg="mod">
+            <ac:chgData name="Khitalishvili, Koba" userId="c02c2335-1b21-4459-93e3-a2125e4631b1" providerId="ADAL" clId="{CD1204E6-FD34-478A-94B4-F7EB36BAC6C8}" dt="2024-11-18T19:36:23.106" v="222"/>
+            <ac:spMkLst>
+              <pc:docMk/>
+              <pc:sldMasterMk cId="1350515898" sldId="2147483672"/>
+              <pc:sldLayoutMk cId="988179574" sldId="2147483677"/>
+              <ac:spMk id="3" creationId="{00000000-0000-0000-0000-000000000000}"/>
+            </ac:spMkLst>
+          </pc:spChg>
+          <pc:spChg chg="mod">
+            <ac:chgData name="Khitalishvili, Koba" userId="c02c2335-1b21-4459-93e3-a2125e4631b1" providerId="ADAL" clId="{CD1204E6-FD34-478A-94B4-F7EB36BAC6C8}" dt="2024-11-18T19:36:23.106" v="222"/>
+            <ac:spMkLst>
+              <pc:docMk/>
+              <pc:sldMasterMk cId="1350515898" sldId="2147483672"/>
+              <pc:sldLayoutMk cId="988179574" sldId="2147483677"/>
+              <ac:spMk id="4" creationId="{00000000-0000-0000-0000-000000000000}"/>
+            </ac:spMkLst>
+          </pc:spChg>
+          <pc:spChg chg="mod">
+            <ac:chgData name="Khitalishvili, Koba" userId="c02c2335-1b21-4459-93e3-a2125e4631b1" providerId="ADAL" clId="{CD1204E6-FD34-478A-94B4-F7EB36BAC6C8}" dt="2024-11-18T19:36:23.106" v="222"/>
+            <ac:spMkLst>
+              <pc:docMk/>
+              <pc:sldMasterMk cId="1350515898" sldId="2147483672"/>
+              <pc:sldLayoutMk cId="988179574" sldId="2147483677"/>
+              <ac:spMk id="5" creationId="{00000000-0000-0000-0000-000000000000}"/>
+            </ac:spMkLst>
+          </pc:spChg>
+          <pc:spChg chg="mod">
+            <ac:chgData name="Khitalishvili, Koba" userId="c02c2335-1b21-4459-93e3-a2125e4631b1" providerId="ADAL" clId="{CD1204E6-FD34-478A-94B4-F7EB36BAC6C8}" dt="2024-11-18T19:36:23.106" v="222"/>
+            <ac:spMkLst>
+              <pc:docMk/>
+              <pc:sldMasterMk cId="1350515898" sldId="2147483672"/>
+              <pc:sldLayoutMk cId="988179574" sldId="2147483677"/>
+              <ac:spMk id="6" creationId="{00000000-0000-0000-0000-000000000000}"/>
+            </ac:spMkLst>
+          </pc:spChg>
+        </pc:sldLayoutChg>
+        <pc:sldLayoutChg chg="modSp">
+          <pc:chgData name="Khitalishvili, Koba" userId="c02c2335-1b21-4459-93e3-a2125e4631b1" providerId="ADAL" clId="{CD1204E6-FD34-478A-94B4-F7EB36BAC6C8}" dt="2024-11-18T19:36:23.106" v="222"/>
+          <pc:sldLayoutMkLst>
+            <pc:docMk/>
+            <pc:sldMasterMk cId="1350515898" sldId="2147483672"/>
+            <pc:sldLayoutMk cId="3842542614" sldId="2147483680"/>
+          </pc:sldLayoutMkLst>
+          <pc:spChg chg="mod">
+            <ac:chgData name="Khitalishvili, Koba" userId="c02c2335-1b21-4459-93e3-a2125e4631b1" providerId="ADAL" clId="{CD1204E6-FD34-478A-94B4-F7EB36BAC6C8}" dt="2024-11-18T19:36:23.106" v="222"/>
+            <ac:spMkLst>
+              <pc:docMk/>
+              <pc:sldMasterMk cId="1350515898" sldId="2147483672"/>
+              <pc:sldLayoutMk cId="3842542614" sldId="2147483680"/>
+              <ac:spMk id="2" creationId="{00000000-0000-0000-0000-000000000000}"/>
+            </ac:spMkLst>
+          </pc:spChg>
+          <pc:spChg chg="mod">
+            <ac:chgData name="Khitalishvili, Koba" userId="c02c2335-1b21-4459-93e3-a2125e4631b1" providerId="ADAL" clId="{CD1204E6-FD34-478A-94B4-F7EB36BAC6C8}" dt="2024-11-18T19:36:23.106" v="222"/>
+            <ac:spMkLst>
+              <pc:docMk/>
+              <pc:sldMasterMk cId="1350515898" sldId="2147483672"/>
+              <pc:sldLayoutMk cId="3842542614" sldId="2147483680"/>
+              <ac:spMk id="3" creationId="{00000000-0000-0000-0000-000000000000}"/>
+            </ac:spMkLst>
+          </pc:spChg>
+          <pc:spChg chg="mod">
+            <ac:chgData name="Khitalishvili, Koba" userId="c02c2335-1b21-4459-93e3-a2125e4631b1" providerId="ADAL" clId="{CD1204E6-FD34-478A-94B4-F7EB36BAC6C8}" dt="2024-11-18T19:36:23.106" v="222"/>
+            <ac:spMkLst>
+              <pc:docMk/>
+              <pc:sldMasterMk cId="1350515898" sldId="2147483672"/>
+              <pc:sldLayoutMk cId="3842542614" sldId="2147483680"/>
+              <ac:spMk id="4" creationId="{00000000-0000-0000-0000-000000000000}"/>
+            </ac:spMkLst>
+          </pc:spChg>
+        </pc:sldLayoutChg>
+        <pc:sldLayoutChg chg="modSp">
+          <pc:chgData name="Khitalishvili, Koba" userId="c02c2335-1b21-4459-93e3-a2125e4631b1" providerId="ADAL" clId="{CD1204E6-FD34-478A-94B4-F7EB36BAC6C8}" dt="2024-11-18T19:36:23.106" v="222"/>
+          <pc:sldLayoutMkLst>
+            <pc:docMk/>
+            <pc:sldMasterMk cId="1350515898" sldId="2147483672"/>
+            <pc:sldLayoutMk cId="3978219478" sldId="2147483681"/>
+          </pc:sldLayoutMkLst>
+          <pc:spChg chg="mod">
+            <ac:chgData name="Khitalishvili, Koba" userId="c02c2335-1b21-4459-93e3-a2125e4631b1" providerId="ADAL" clId="{CD1204E6-FD34-478A-94B4-F7EB36BAC6C8}" dt="2024-11-18T19:36:23.106" v="222"/>
+            <ac:spMkLst>
+              <pc:docMk/>
+              <pc:sldMasterMk cId="1350515898" sldId="2147483672"/>
+              <pc:sldLayoutMk cId="3978219478" sldId="2147483681"/>
+              <ac:spMk id="2" creationId="{00000000-0000-0000-0000-000000000000}"/>
+            </ac:spMkLst>
+          </pc:spChg>
+          <pc:spChg chg="mod">
+            <ac:chgData name="Khitalishvili, Koba" userId="c02c2335-1b21-4459-93e3-a2125e4631b1" providerId="ADAL" clId="{CD1204E6-FD34-478A-94B4-F7EB36BAC6C8}" dt="2024-11-18T19:36:23.106" v="222"/>
+            <ac:spMkLst>
+              <pc:docMk/>
+              <pc:sldMasterMk cId="1350515898" sldId="2147483672"/>
+              <pc:sldLayoutMk cId="3978219478" sldId="2147483681"/>
+              <ac:spMk id="3" creationId="{00000000-0000-0000-0000-000000000000}"/>
+            </ac:spMkLst>
+          </pc:spChg>
+          <pc:spChg chg="mod">
+            <ac:chgData name="Khitalishvili, Koba" userId="c02c2335-1b21-4459-93e3-a2125e4631b1" providerId="ADAL" clId="{CD1204E6-FD34-478A-94B4-F7EB36BAC6C8}" dt="2024-11-18T19:36:23.106" v="222"/>
+            <ac:spMkLst>
+              <pc:docMk/>
+              <pc:sldMasterMk cId="1350515898" sldId="2147483672"/>
+              <pc:sldLayoutMk cId="3978219478" sldId="2147483681"/>
+              <ac:spMk id="4" creationId="{00000000-0000-0000-0000-000000000000}"/>
+            </ac:spMkLst>
+          </pc:spChg>
+        </pc:sldLayoutChg>
+        <pc:sldLayoutChg chg="modSp">
+          <pc:chgData name="Khitalishvili, Koba" userId="c02c2335-1b21-4459-93e3-a2125e4631b1" providerId="ADAL" clId="{CD1204E6-FD34-478A-94B4-F7EB36BAC6C8}" dt="2024-11-18T19:36:23.106" v="222"/>
+          <pc:sldLayoutMkLst>
+            <pc:docMk/>
+            <pc:sldMasterMk cId="1350515898" sldId="2147483672"/>
+            <pc:sldLayoutMk cId="766640973" sldId="2147483683"/>
+          </pc:sldLayoutMkLst>
+          <pc:spChg chg="mod">
+            <ac:chgData name="Khitalishvili, Koba" userId="c02c2335-1b21-4459-93e3-a2125e4631b1" providerId="ADAL" clId="{CD1204E6-FD34-478A-94B4-F7EB36BAC6C8}" dt="2024-11-18T19:36:23.106" v="222"/>
+            <ac:spMkLst>
+              <pc:docMk/>
+              <pc:sldMasterMk cId="1350515898" sldId="2147483672"/>
+              <pc:sldLayoutMk cId="766640973" sldId="2147483683"/>
+              <ac:spMk id="2" creationId="{00000000-0000-0000-0000-000000000000}"/>
+            </ac:spMkLst>
+          </pc:spChg>
+          <pc:spChg chg="mod">
+            <ac:chgData name="Khitalishvili, Koba" userId="c02c2335-1b21-4459-93e3-a2125e4631b1" providerId="ADAL" clId="{CD1204E6-FD34-478A-94B4-F7EB36BAC6C8}" dt="2024-11-18T19:36:23.106" v="222"/>
+            <ac:spMkLst>
+              <pc:docMk/>
+              <pc:sldMasterMk cId="1350515898" sldId="2147483672"/>
+              <pc:sldLayoutMk cId="766640973" sldId="2147483683"/>
+              <ac:spMk id="3" creationId="{00000000-0000-0000-0000-000000000000}"/>
+            </ac:spMkLst>
+          </pc:spChg>
+        </pc:sldLayoutChg>
+      </pc:sldMasterChg>
+      <pc:sldMasterChg chg="modSp modSldLayout">
+        <pc:chgData name="Khitalishvili, Koba" userId="c02c2335-1b21-4459-93e3-a2125e4631b1" providerId="ADAL" clId="{CD1204E6-FD34-478A-94B4-F7EB36BAC6C8}" dt="2024-11-18T19:14:37.974" v="219"/>
+        <pc:sldMasterMkLst>
+          <pc:docMk/>
+          <pc:sldMasterMk cId="2928706238" sldId="2147483672"/>
+        </pc:sldMasterMkLst>
+        <pc:spChg chg="mod">
+          <ac:chgData name="Khitalishvili, Koba" userId="c02c2335-1b21-4459-93e3-a2125e4631b1" providerId="ADAL" clId="{CD1204E6-FD34-478A-94B4-F7EB36BAC6C8}" dt="2024-11-18T19:14:37.974" v="219"/>
+          <ac:spMkLst>
+            <pc:docMk/>
+            <pc:sldMasterMk cId="2928706238" sldId="2147483672"/>
+            <ac:spMk id="2" creationId="{00000000-0000-0000-0000-000000000000}"/>
+          </ac:spMkLst>
+        </pc:spChg>
+        <pc:spChg chg="mod">
+          <ac:chgData name="Khitalishvili, Koba" userId="c02c2335-1b21-4459-93e3-a2125e4631b1" providerId="ADAL" clId="{CD1204E6-FD34-478A-94B4-F7EB36BAC6C8}" dt="2024-11-18T19:14:37.974" v="219"/>
+          <ac:spMkLst>
+            <pc:docMk/>
+            <pc:sldMasterMk cId="2928706238" sldId="2147483672"/>
+            <ac:spMk id="3" creationId="{00000000-0000-0000-0000-000000000000}"/>
+          </ac:spMkLst>
+        </pc:spChg>
+        <pc:spChg chg="mod">
+          <ac:chgData name="Khitalishvili, Koba" userId="c02c2335-1b21-4459-93e3-a2125e4631b1" providerId="ADAL" clId="{CD1204E6-FD34-478A-94B4-F7EB36BAC6C8}" dt="2024-11-18T19:14:37.974" v="219"/>
+          <ac:spMkLst>
+            <pc:docMk/>
+            <pc:sldMasterMk cId="2928706238" sldId="2147483672"/>
+            <ac:spMk id="4" creationId="{00000000-0000-0000-0000-000000000000}"/>
+          </ac:spMkLst>
+        </pc:spChg>
+        <pc:spChg chg="mod">
+          <ac:chgData name="Khitalishvili, Koba" userId="c02c2335-1b21-4459-93e3-a2125e4631b1" providerId="ADAL" clId="{CD1204E6-FD34-478A-94B4-F7EB36BAC6C8}" dt="2024-11-18T19:14:37.974" v="219"/>
+          <ac:spMkLst>
+            <pc:docMk/>
+            <pc:sldMasterMk cId="2928706238" sldId="2147483672"/>
+            <ac:spMk id="5" creationId="{00000000-0000-0000-0000-000000000000}"/>
+          </ac:spMkLst>
+        </pc:spChg>
+        <pc:spChg chg="mod">
+          <ac:chgData name="Khitalishvili, Koba" userId="c02c2335-1b21-4459-93e3-a2125e4631b1" providerId="ADAL" clId="{CD1204E6-FD34-478A-94B4-F7EB36BAC6C8}" dt="2024-11-18T19:14:37.974" v="219"/>
+          <ac:spMkLst>
+            <pc:docMk/>
+            <pc:sldMasterMk cId="2928706238" sldId="2147483672"/>
+            <ac:spMk id="6" creationId="{00000000-0000-0000-0000-000000000000}"/>
+          </ac:spMkLst>
+        </pc:spChg>
+        <pc:sldLayoutChg chg="modSp">
+          <pc:chgData name="Khitalishvili, Koba" userId="c02c2335-1b21-4459-93e3-a2125e4631b1" providerId="ADAL" clId="{CD1204E6-FD34-478A-94B4-F7EB36BAC6C8}" dt="2024-11-18T19:14:37.974" v="219"/>
+          <pc:sldLayoutMkLst>
+            <pc:docMk/>
+            <pc:sldMasterMk cId="2928706238" sldId="2147483672"/>
+            <pc:sldLayoutMk cId="2988411370" sldId="2147483673"/>
+          </pc:sldLayoutMkLst>
+          <pc:spChg chg="mod">
+            <ac:chgData name="Khitalishvili, Koba" userId="c02c2335-1b21-4459-93e3-a2125e4631b1" providerId="ADAL" clId="{CD1204E6-FD34-478A-94B4-F7EB36BAC6C8}" dt="2024-11-18T19:14:37.974" v="219"/>
+            <ac:spMkLst>
+              <pc:docMk/>
+              <pc:sldMasterMk cId="2928706238" sldId="2147483672"/>
+              <pc:sldLayoutMk cId="2988411370" sldId="2147483673"/>
+              <ac:spMk id="2" creationId="{00000000-0000-0000-0000-000000000000}"/>
+            </ac:spMkLst>
+          </pc:spChg>
+          <pc:spChg chg="mod">
+            <ac:chgData name="Khitalishvili, Koba" userId="c02c2335-1b21-4459-93e3-a2125e4631b1" providerId="ADAL" clId="{CD1204E6-FD34-478A-94B4-F7EB36BAC6C8}" dt="2024-11-18T19:14:37.974" v="219"/>
+            <ac:spMkLst>
+              <pc:docMk/>
+              <pc:sldMasterMk cId="2928706238" sldId="2147483672"/>
+              <pc:sldLayoutMk cId="2988411370" sldId="2147483673"/>
+              <ac:spMk id="3" creationId="{00000000-0000-0000-0000-000000000000}"/>
+            </ac:spMkLst>
+          </pc:spChg>
+        </pc:sldLayoutChg>
+        <pc:sldLayoutChg chg="modSp">
+          <pc:chgData name="Khitalishvili, Koba" userId="c02c2335-1b21-4459-93e3-a2125e4631b1" providerId="ADAL" clId="{CD1204E6-FD34-478A-94B4-F7EB36BAC6C8}" dt="2024-11-18T19:14:37.974" v="219"/>
+          <pc:sldLayoutMkLst>
+            <pc:docMk/>
+            <pc:sldMasterMk cId="2928706238" sldId="2147483672"/>
+            <pc:sldLayoutMk cId="2859747164" sldId="2147483675"/>
+          </pc:sldLayoutMkLst>
+          <pc:spChg chg="mod">
+            <ac:chgData name="Khitalishvili, Koba" userId="c02c2335-1b21-4459-93e3-a2125e4631b1" providerId="ADAL" clId="{CD1204E6-FD34-478A-94B4-F7EB36BAC6C8}" dt="2024-11-18T19:14:37.974" v="219"/>
+            <ac:spMkLst>
+              <pc:docMk/>
+              <pc:sldMasterMk cId="2928706238" sldId="2147483672"/>
+              <pc:sldLayoutMk cId="2859747164" sldId="2147483675"/>
+              <ac:spMk id="2" creationId="{00000000-0000-0000-0000-000000000000}"/>
+            </ac:spMkLst>
+          </pc:spChg>
+          <pc:spChg chg="mod">
+            <ac:chgData name="Khitalishvili, Koba" userId="c02c2335-1b21-4459-93e3-a2125e4631b1" providerId="ADAL" clId="{CD1204E6-FD34-478A-94B4-F7EB36BAC6C8}" dt="2024-11-18T19:14:37.974" v="219"/>
+            <ac:spMkLst>
+              <pc:docMk/>
+              <pc:sldMasterMk cId="2928706238" sldId="2147483672"/>
+              <pc:sldLayoutMk cId="2859747164" sldId="2147483675"/>
+              <ac:spMk id="3" creationId="{00000000-0000-0000-0000-000000000000}"/>
+            </ac:spMkLst>
+          </pc:spChg>
+        </pc:sldLayoutChg>
+        <pc:sldLayoutChg chg="modSp">
+          <pc:chgData name="Khitalishvili, Koba" userId="c02c2335-1b21-4459-93e3-a2125e4631b1" providerId="ADAL" clId="{CD1204E6-FD34-478A-94B4-F7EB36BAC6C8}" dt="2024-11-18T19:14:37.974" v="219"/>
+          <pc:sldLayoutMkLst>
+            <pc:docMk/>
+            <pc:sldMasterMk cId="2928706238" sldId="2147483672"/>
+            <pc:sldLayoutMk cId="3528431339" sldId="2147483676"/>
+          </pc:sldLayoutMkLst>
+          <pc:spChg chg="mod">
+            <ac:chgData name="Khitalishvili, Koba" userId="c02c2335-1b21-4459-93e3-a2125e4631b1" providerId="ADAL" clId="{CD1204E6-FD34-478A-94B4-F7EB36BAC6C8}" dt="2024-11-18T19:14:37.974" v="219"/>
+            <ac:spMkLst>
+              <pc:docMk/>
+              <pc:sldMasterMk cId="2928706238" sldId="2147483672"/>
+              <pc:sldLayoutMk cId="3528431339" sldId="2147483676"/>
+              <ac:spMk id="3" creationId="{00000000-0000-0000-0000-000000000000}"/>
+            </ac:spMkLst>
+          </pc:spChg>
+          <pc:spChg chg="mod">
+            <ac:chgData name="Khitalishvili, Koba" userId="c02c2335-1b21-4459-93e3-a2125e4631b1" providerId="ADAL" clId="{CD1204E6-FD34-478A-94B4-F7EB36BAC6C8}" dt="2024-11-18T19:14:37.974" v="219"/>
+            <ac:spMkLst>
+              <pc:docMk/>
+              <pc:sldMasterMk cId="2928706238" sldId="2147483672"/>
+              <pc:sldLayoutMk cId="3528431339" sldId="2147483676"/>
+              <ac:spMk id="4" creationId="{00000000-0000-0000-0000-000000000000}"/>
+            </ac:spMkLst>
+          </pc:spChg>
+        </pc:sldLayoutChg>
+        <pc:sldLayoutChg chg="modSp">
+          <pc:chgData name="Khitalishvili, Koba" userId="c02c2335-1b21-4459-93e3-a2125e4631b1" providerId="ADAL" clId="{CD1204E6-FD34-478A-94B4-F7EB36BAC6C8}" dt="2024-11-18T19:14:37.974" v="219"/>
+          <pc:sldLayoutMkLst>
+            <pc:docMk/>
+            <pc:sldMasterMk cId="2928706238" sldId="2147483672"/>
+            <pc:sldLayoutMk cId="3094871861" sldId="2147483677"/>
+          </pc:sldLayoutMkLst>
+          <pc:spChg chg="mod">
+            <ac:chgData name="Khitalishvili, Koba" userId="c02c2335-1b21-4459-93e3-a2125e4631b1" providerId="ADAL" clId="{CD1204E6-FD34-478A-94B4-F7EB36BAC6C8}" dt="2024-11-18T19:14:37.974" v="219"/>
+            <ac:spMkLst>
+              <pc:docMk/>
+              <pc:sldMasterMk cId="2928706238" sldId="2147483672"/>
+              <pc:sldLayoutMk cId="3094871861" sldId="2147483677"/>
+              <ac:spMk id="2" creationId="{00000000-0000-0000-0000-000000000000}"/>
+            </ac:spMkLst>
+          </pc:spChg>
+          <pc:spChg chg="mod">
+            <ac:chgData name="Khitalishvili, Koba" userId="c02c2335-1b21-4459-93e3-a2125e4631b1" providerId="ADAL" clId="{CD1204E6-FD34-478A-94B4-F7EB36BAC6C8}" dt="2024-11-18T19:14:37.974" v="219"/>
+            <ac:spMkLst>
+              <pc:docMk/>
+              <pc:sldMasterMk cId="2928706238" sldId="2147483672"/>
+              <pc:sldLayoutMk cId="3094871861" sldId="2147483677"/>
+              <ac:spMk id="3" creationId="{00000000-0000-0000-0000-000000000000}"/>
+            </ac:spMkLst>
+          </pc:spChg>
+          <pc:spChg chg="mod">
+            <ac:chgData name="Khitalishvili, Koba" userId="c02c2335-1b21-4459-93e3-a2125e4631b1" providerId="ADAL" clId="{CD1204E6-FD34-478A-94B4-F7EB36BAC6C8}" dt="2024-11-18T19:14:37.974" v="219"/>
+            <ac:spMkLst>
+              <pc:docMk/>
+              <pc:sldMasterMk cId="2928706238" sldId="2147483672"/>
+              <pc:sldLayoutMk cId="3094871861" sldId="2147483677"/>
+              <ac:spMk id="4" creationId="{00000000-0000-0000-0000-000000000000}"/>
+            </ac:spMkLst>
+          </pc:spChg>
+          <pc:spChg chg="mod">
+            <ac:chgData name="Khitalishvili, Koba" userId="c02c2335-1b21-4459-93e3-a2125e4631b1" providerId="ADAL" clId="{CD1204E6-FD34-478A-94B4-F7EB36BAC6C8}" dt="2024-11-18T19:14:37.974" v="219"/>
+            <ac:spMkLst>
+              <pc:docMk/>
+              <pc:sldMasterMk cId="2928706238" sldId="2147483672"/>
+              <pc:sldLayoutMk cId="3094871861" sldId="2147483677"/>
+              <ac:spMk id="5" creationId="{00000000-0000-0000-0000-000000000000}"/>
+            </ac:spMkLst>
+          </pc:spChg>
+          <pc:spChg chg="mod">
+            <ac:chgData name="Khitalishvili, Koba" userId="c02c2335-1b21-4459-93e3-a2125e4631b1" providerId="ADAL" clId="{CD1204E6-FD34-478A-94B4-F7EB36BAC6C8}" dt="2024-11-18T19:14:37.974" v="219"/>
+            <ac:spMkLst>
+              <pc:docMk/>
+              <pc:sldMasterMk cId="2928706238" sldId="2147483672"/>
+              <pc:sldLayoutMk cId="3094871861" sldId="2147483677"/>
+              <ac:spMk id="6" creationId="{00000000-0000-0000-0000-000000000000}"/>
+            </ac:spMkLst>
+          </pc:spChg>
+        </pc:sldLayoutChg>
+        <pc:sldLayoutChg chg="modSp">
+          <pc:chgData name="Khitalishvili, Koba" userId="c02c2335-1b21-4459-93e3-a2125e4631b1" providerId="ADAL" clId="{CD1204E6-FD34-478A-94B4-F7EB36BAC6C8}" dt="2024-11-18T19:14:37.974" v="219"/>
+          <pc:sldLayoutMkLst>
+            <pc:docMk/>
+            <pc:sldMasterMk cId="2928706238" sldId="2147483672"/>
+            <pc:sldLayoutMk cId="2192572359" sldId="2147483680"/>
+          </pc:sldLayoutMkLst>
+          <pc:spChg chg="mod">
+            <ac:chgData name="Khitalishvili, Koba" userId="c02c2335-1b21-4459-93e3-a2125e4631b1" providerId="ADAL" clId="{CD1204E6-FD34-478A-94B4-F7EB36BAC6C8}" dt="2024-11-18T19:14:37.974" v="219"/>
+            <ac:spMkLst>
+              <pc:docMk/>
+              <pc:sldMasterMk cId="2928706238" sldId="2147483672"/>
+              <pc:sldLayoutMk cId="2192572359" sldId="2147483680"/>
+              <ac:spMk id="2" creationId="{00000000-0000-0000-0000-000000000000}"/>
+            </ac:spMkLst>
+          </pc:spChg>
+          <pc:spChg chg="mod">
+            <ac:chgData name="Khitalishvili, Koba" userId="c02c2335-1b21-4459-93e3-a2125e4631b1" providerId="ADAL" clId="{CD1204E6-FD34-478A-94B4-F7EB36BAC6C8}" dt="2024-11-18T19:14:37.974" v="219"/>
+            <ac:spMkLst>
+              <pc:docMk/>
+              <pc:sldMasterMk cId="2928706238" sldId="2147483672"/>
+              <pc:sldLayoutMk cId="2192572359" sldId="2147483680"/>
+              <ac:spMk id="3" creationId="{00000000-0000-0000-0000-000000000000}"/>
+            </ac:spMkLst>
+          </pc:spChg>
+          <pc:spChg chg="mod">
+            <ac:chgData name="Khitalishvili, Koba" userId="c02c2335-1b21-4459-93e3-a2125e4631b1" providerId="ADAL" clId="{CD1204E6-FD34-478A-94B4-F7EB36BAC6C8}" dt="2024-11-18T19:14:37.974" v="219"/>
+            <ac:spMkLst>
+              <pc:docMk/>
+              <pc:sldMasterMk cId="2928706238" sldId="2147483672"/>
+              <pc:sldLayoutMk cId="2192572359" sldId="2147483680"/>
+              <ac:spMk id="4" creationId="{00000000-0000-0000-0000-000000000000}"/>
+            </ac:spMkLst>
+          </pc:spChg>
+        </pc:sldLayoutChg>
+        <pc:sldLayoutChg chg="modSp">
+          <pc:chgData name="Khitalishvili, Koba" userId="c02c2335-1b21-4459-93e3-a2125e4631b1" providerId="ADAL" clId="{CD1204E6-FD34-478A-94B4-F7EB36BAC6C8}" dt="2024-11-18T19:14:37.974" v="219"/>
+          <pc:sldLayoutMkLst>
+            <pc:docMk/>
+            <pc:sldMasterMk cId="2928706238" sldId="2147483672"/>
+            <pc:sldLayoutMk cId="2471188281" sldId="2147483681"/>
+          </pc:sldLayoutMkLst>
+          <pc:spChg chg="mod">
+            <ac:chgData name="Khitalishvili, Koba" userId="c02c2335-1b21-4459-93e3-a2125e4631b1" providerId="ADAL" clId="{CD1204E6-FD34-478A-94B4-F7EB36BAC6C8}" dt="2024-11-18T19:14:37.974" v="219"/>
+            <ac:spMkLst>
+              <pc:docMk/>
+              <pc:sldMasterMk cId="2928706238" sldId="2147483672"/>
+              <pc:sldLayoutMk cId="2471188281" sldId="2147483681"/>
+              <ac:spMk id="2" creationId="{00000000-0000-0000-0000-000000000000}"/>
+            </ac:spMkLst>
+          </pc:spChg>
+          <pc:spChg chg="mod">
+            <ac:chgData name="Khitalishvili, Koba" userId="c02c2335-1b21-4459-93e3-a2125e4631b1" providerId="ADAL" clId="{CD1204E6-FD34-478A-94B4-F7EB36BAC6C8}" dt="2024-11-18T19:14:37.974" v="219"/>
+            <ac:spMkLst>
+              <pc:docMk/>
+              <pc:sldMasterMk cId="2928706238" sldId="2147483672"/>
+              <pc:sldLayoutMk cId="2471188281" sldId="2147483681"/>
+              <ac:spMk id="3" creationId="{00000000-0000-0000-0000-000000000000}"/>
+            </ac:spMkLst>
+          </pc:spChg>
+          <pc:spChg chg="mod">
+            <ac:chgData name="Khitalishvili, Koba" userId="c02c2335-1b21-4459-93e3-a2125e4631b1" providerId="ADAL" clId="{CD1204E6-FD34-478A-94B4-F7EB36BAC6C8}" dt="2024-11-18T19:14:37.974" v="219"/>
+            <ac:spMkLst>
+              <pc:docMk/>
+              <pc:sldMasterMk cId="2928706238" sldId="2147483672"/>
+              <pc:sldLayoutMk cId="2471188281" sldId="2147483681"/>
+              <ac:spMk id="4" creationId="{00000000-0000-0000-0000-000000000000}"/>
+            </ac:spMkLst>
+          </pc:spChg>
+        </pc:sldLayoutChg>
+        <pc:sldLayoutChg chg="modSp">
+          <pc:chgData name="Khitalishvili, Koba" userId="c02c2335-1b21-4459-93e3-a2125e4631b1" providerId="ADAL" clId="{CD1204E6-FD34-478A-94B4-F7EB36BAC6C8}" dt="2024-11-18T19:14:37.974" v="219"/>
+          <pc:sldLayoutMkLst>
+            <pc:docMk/>
+            <pc:sldMasterMk cId="2928706238" sldId="2147483672"/>
+            <pc:sldLayoutMk cId="1883780329" sldId="2147483683"/>
+          </pc:sldLayoutMkLst>
+          <pc:spChg chg="mod">
+            <ac:chgData name="Khitalishvili, Koba" userId="c02c2335-1b21-4459-93e3-a2125e4631b1" providerId="ADAL" clId="{CD1204E6-FD34-478A-94B4-F7EB36BAC6C8}" dt="2024-11-18T19:14:37.974" v="219"/>
+            <ac:spMkLst>
+              <pc:docMk/>
+              <pc:sldMasterMk cId="2928706238" sldId="2147483672"/>
+              <pc:sldLayoutMk cId="1883780329" sldId="2147483683"/>
+              <ac:spMk id="2" creationId="{00000000-0000-0000-0000-000000000000}"/>
+            </ac:spMkLst>
+          </pc:spChg>
+          <pc:spChg chg="mod">
+            <ac:chgData name="Khitalishvili, Koba" userId="c02c2335-1b21-4459-93e3-a2125e4631b1" providerId="ADAL" clId="{CD1204E6-FD34-478A-94B4-F7EB36BAC6C8}" dt="2024-11-18T19:14:37.974" v="219"/>
+            <ac:spMkLst>
+              <pc:docMk/>
+              <pc:sldMasterMk cId="2928706238" sldId="2147483672"/>
+              <pc:sldLayoutMk cId="1883780329" sldId="2147483683"/>
+              <ac:spMk id="3" creationId="{00000000-0000-0000-0000-000000000000}"/>
+            </ac:spMkLst>
+          </pc:spChg>
+        </pc:sldLayoutChg>
+      </pc:sldMasterChg>
+    </pc:docChg>
+  </pc:docChgLst>
+</pc:chgInfo>
 </file>
 
 <file path=ppt/slideLayouts/slideLayout1.xml><?xml version="1.0" encoding="utf-8"?>
@@ -137,15 +1382,15 @@
         </p:nvSpPr>
         <p:spPr>
           <a:xfrm>
-            <a:off x="914400" y="1346836"/>
-            <a:ext cx="10363200" cy="2865120"/>
+            <a:off x="1714500" y="1346836"/>
+            <a:ext cx="10287000" cy="2865120"/>
           </a:xfrm>
         </p:spPr>
         <p:txBody>
           <a:bodyPr anchor="b"/>
           <a:lstStyle>
             <a:lvl1pPr algn="ctr">
-              <a:defRPr sz="7200"/>
+              <a:defRPr sz="6750"/>
             </a:lvl1pPr>
           </a:lstStyle>
           <a:p>
@@ -169,8 +1414,8 @@
         </p:nvSpPr>
         <p:spPr>
           <a:xfrm>
-            <a:off x="1524000" y="4322446"/>
-            <a:ext cx="9144000" cy="1986914"/>
+            <a:off x="1714500" y="4322446"/>
+            <a:ext cx="10287000" cy="1986914"/>
           </a:xfrm>
         </p:spPr>
         <p:txBody>
@@ -178,39 +1423,39 @@
           <a:lstStyle>
             <a:lvl1pPr marL="0" indent="0" algn="ctr">
               <a:buNone/>
-              <a:defRPr sz="2880"/>
+              <a:defRPr sz="2700"/>
             </a:lvl1pPr>
-            <a:lvl2pPr marL="548640" indent="0" algn="ctr">
-              <a:buNone/>
-              <a:defRPr sz="2400"/>
+            <a:lvl2pPr marL="514350" indent="0" algn="ctr">
+              <a:buNone/>
+              <a:defRPr sz="2250"/>
             </a:lvl2pPr>
-            <a:lvl3pPr marL="1097280" indent="0" algn="ctr">
-              <a:buNone/>
-              <a:defRPr sz="2160"/>
+            <a:lvl3pPr marL="1028700" indent="0" algn="ctr">
+              <a:buNone/>
+              <a:defRPr sz="2025"/>
             </a:lvl3pPr>
-            <a:lvl4pPr marL="1645920" indent="0" algn="ctr">
-              <a:buNone/>
-              <a:defRPr sz="1920"/>
+            <a:lvl4pPr marL="1543050" indent="0" algn="ctr">
+              <a:buNone/>
+              <a:defRPr sz="1800"/>
             </a:lvl4pPr>
-            <a:lvl5pPr marL="2194560" indent="0" algn="ctr">
-              <a:buNone/>
-              <a:defRPr sz="1920"/>
+            <a:lvl5pPr marL="2057400" indent="0" algn="ctr">
+              <a:buNone/>
+              <a:defRPr sz="1800"/>
             </a:lvl5pPr>
-            <a:lvl6pPr marL="2743200" indent="0" algn="ctr">
-              <a:buNone/>
-              <a:defRPr sz="1920"/>
+            <a:lvl6pPr marL="2571750" indent="0" algn="ctr">
+              <a:buNone/>
+              <a:defRPr sz="1800"/>
             </a:lvl6pPr>
-            <a:lvl7pPr marL="3291840" indent="0" algn="ctr">
-              <a:buNone/>
-              <a:defRPr sz="1920"/>
+            <a:lvl7pPr marL="3086100" indent="0" algn="ctr">
+              <a:buNone/>
+              <a:defRPr sz="1800"/>
             </a:lvl7pPr>
-            <a:lvl8pPr marL="3840480" indent="0" algn="ctr">
-              <a:buNone/>
-              <a:defRPr sz="1920"/>
+            <a:lvl8pPr marL="3600450" indent="0" algn="ctr">
+              <a:buNone/>
+              <a:defRPr sz="1800"/>
             </a:lvl8pPr>
-            <a:lvl9pPr marL="4389120" indent="0" algn="ctr">
-              <a:buNone/>
-              <a:defRPr sz="1920"/>
+            <a:lvl9pPr marL="4114800" indent="0" algn="ctr">
+              <a:buNone/>
+              <a:defRPr sz="1800"/>
             </a:lvl9pPr>
           </a:lstStyle>
           <a:p>
@@ -290,7 +1535,7 @@
     </p:spTree>
     <p:extLst>
       <p:ext uri="{BB962C8B-B14F-4D97-AF65-F5344CB8AC3E}">
-        <p14:creationId xmlns:p14="http://schemas.microsoft.com/office/powerpoint/2010/main" val="4132962695"/>
+        <p14:creationId xmlns:p14="http://schemas.microsoft.com/office/powerpoint/2010/main" val="3167345891"/>
       </p:ext>
     </p:extLst>
   </p:cSld>
@@ -460,7 +1705,7 @@
     </p:spTree>
     <p:extLst>
       <p:ext uri="{BB962C8B-B14F-4D97-AF65-F5344CB8AC3E}">
-        <p14:creationId xmlns:p14="http://schemas.microsoft.com/office/powerpoint/2010/main" val="471841640"/>
+        <p14:creationId xmlns:p14="http://schemas.microsoft.com/office/powerpoint/2010/main" val="585163233"/>
       </p:ext>
     </p:extLst>
   </p:cSld>
@@ -499,8 +1744,8 @@
         </p:nvSpPr>
         <p:spPr>
           <a:xfrm>
-            <a:off x="8724901" y="438150"/>
-            <a:ext cx="2628900" cy="6974206"/>
+            <a:off x="9815512" y="438150"/>
+            <a:ext cx="2957513" cy="6974206"/>
           </a:xfrm>
         </p:spPr>
         <p:txBody>
@@ -527,8 +1772,8 @@
         </p:nvSpPr>
         <p:spPr>
           <a:xfrm>
-            <a:off x="838201" y="438150"/>
-            <a:ext cx="7734300" cy="6974206"/>
+            <a:off x="942975" y="438150"/>
+            <a:ext cx="8701088" cy="6974206"/>
           </a:xfrm>
         </p:spPr>
         <p:txBody>
@@ -640,7 +1885,7 @@
     </p:spTree>
     <p:extLst>
       <p:ext uri="{BB962C8B-B14F-4D97-AF65-F5344CB8AC3E}">
-        <p14:creationId xmlns:p14="http://schemas.microsoft.com/office/powerpoint/2010/main" val="1084632251"/>
+        <p14:creationId xmlns:p14="http://schemas.microsoft.com/office/powerpoint/2010/main" val="3265546637"/>
       </p:ext>
     </p:extLst>
   </p:cSld>
@@ -810,7 +2055,7 @@
     </p:spTree>
     <p:extLst>
       <p:ext uri="{BB962C8B-B14F-4D97-AF65-F5344CB8AC3E}">
-        <p14:creationId xmlns:p14="http://schemas.microsoft.com/office/powerpoint/2010/main" val="2541151423"/>
+        <p14:creationId xmlns:p14="http://schemas.microsoft.com/office/powerpoint/2010/main" val="4198354313"/>
       </p:ext>
     </p:extLst>
   </p:cSld>
@@ -849,15 +2094,15 @@
         </p:nvSpPr>
         <p:spPr>
           <a:xfrm>
-            <a:off x="831851" y="2051688"/>
-            <a:ext cx="10515600" cy="3423284"/>
+            <a:off x="935831" y="2051686"/>
+            <a:ext cx="11830050" cy="3423284"/>
           </a:xfrm>
         </p:spPr>
         <p:txBody>
           <a:bodyPr anchor="b"/>
           <a:lstStyle>
             <a:lvl1pPr>
-              <a:defRPr sz="7200"/>
+              <a:defRPr sz="6750"/>
             </a:lvl1pPr>
           </a:lstStyle>
           <a:p>
@@ -881,8 +2126,8 @@
         </p:nvSpPr>
         <p:spPr>
           <a:xfrm>
-            <a:off x="831851" y="5507358"/>
-            <a:ext cx="10515600" cy="1800224"/>
+            <a:off x="935831" y="5507356"/>
+            <a:ext cx="11830050" cy="1800224"/>
           </a:xfrm>
         </p:spPr>
         <p:txBody>
@@ -890,7 +2135,7 @@
           <a:lstStyle>
             <a:lvl1pPr marL="0" indent="0">
               <a:buNone/>
-              <a:defRPr sz="2880">
+              <a:defRPr sz="2700">
                 <a:solidFill>
                   <a:schemeClr val="tx1">
                     <a:tint val="82000"/>
@@ -898,9 +2143,9 @@
                 </a:solidFill>
               </a:defRPr>
             </a:lvl1pPr>
-            <a:lvl2pPr marL="548640" indent="0">
-              <a:buNone/>
-              <a:defRPr sz="2400">
+            <a:lvl2pPr marL="514350" indent="0">
+              <a:buNone/>
+              <a:defRPr sz="2250">
                 <a:solidFill>
                   <a:schemeClr val="tx1">
                     <a:tint val="82000"/>
@@ -908,9 +2153,9 @@
                 </a:solidFill>
               </a:defRPr>
             </a:lvl2pPr>
-            <a:lvl3pPr marL="1097280" indent="0">
-              <a:buNone/>
-              <a:defRPr sz="2160">
+            <a:lvl3pPr marL="1028700" indent="0">
+              <a:buNone/>
+              <a:defRPr sz="2025">
                 <a:solidFill>
                   <a:schemeClr val="tx1">
                     <a:tint val="82000"/>
@@ -918,9 +2163,9 @@
                 </a:solidFill>
               </a:defRPr>
             </a:lvl3pPr>
-            <a:lvl4pPr marL="1645920" indent="0">
-              <a:buNone/>
-              <a:defRPr sz="1920">
+            <a:lvl4pPr marL="1543050" indent="0">
+              <a:buNone/>
+              <a:defRPr sz="1800">
                 <a:solidFill>
                   <a:schemeClr val="tx1">
                     <a:tint val="82000"/>
@@ -928,9 +2173,9 @@
                 </a:solidFill>
               </a:defRPr>
             </a:lvl4pPr>
-            <a:lvl5pPr marL="2194560" indent="0">
-              <a:buNone/>
-              <a:defRPr sz="1920">
+            <a:lvl5pPr marL="2057400" indent="0">
+              <a:buNone/>
+              <a:defRPr sz="1800">
                 <a:solidFill>
                   <a:schemeClr val="tx1">
                     <a:tint val="82000"/>
@@ -938,9 +2183,9 @@
                 </a:solidFill>
               </a:defRPr>
             </a:lvl5pPr>
-            <a:lvl6pPr marL="2743200" indent="0">
-              <a:buNone/>
-              <a:defRPr sz="1920">
+            <a:lvl6pPr marL="2571750" indent="0">
+              <a:buNone/>
+              <a:defRPr sz="1800">
                 <a:solidFill>
                   <a:schemeClr val="tx1">
                     <a:tint val="82000"/>
@@ -948,9 +2193,9 @@
                 </a:solidFill>
               </a:defRPr>
             </a:lvl6pPr>
-            <a:lvl7pPr marL="3291840" indent="0">
-              <a:buNone/>
-              <a:defRPr sz="1920">
+            <a:lvl7pPr marL="3086100" indent="0">
+              <a:buNone/>
+              <a:defRPr sz="1800">
                 <a:solidFill>
                   <a:schemeClr val="tx1">
                     <a:tint val="82000"/>
@@ -958,9 +2203,9 @@
                 </a:solidFill>
               </a:defRPr>
             </a:lvl7pPr>
-            <a:lvl8pPr marL="3840480" indent="0">
-              <a:buNone/>
-              <a:defRPr sz="1920">
+            <a:lvl8pPr marL="3600450" indent="0">
+              <a:buNone/>
+              <a:defRPr sz="1800">
                 <a:solidFill>
                   <a:schemeClr val="tx1">
                     <a:tint val="82000"/>
@@ -968,9 +2213,9 @@
                 </a:solidFill>
               </a:defRPr>
             </a:lvl8pPr>
-            <a:lvl9pPr marL="4389120" indent="0">
-              <a:buNone/>
-              <a:defRPr sz="1920">
+            <a:lvl9pPr marL="4114800" indent="0">
+              <a:buNone/>
+              <a:defRPr sz="1800">
                 <a:solidFill>
                   <a:schemeClr val="tx1">
                     <a:tint val="82000"/>
@@ -1056,7 +2301,7 @@
     </p:spTree>
     <p:extLst>
       <p:ext uri="{BB962C8B-B14F-4D97-AF65-F5344CB8AC3E}">
-        <p14:creationId xmlns:p14="http://schemas.microsoft.com/office/powerpoint/2010/main" val="3456582653"/>
+        <p14:creationId xmlns:p14="http://schemas.microsoft.com/office/powerpoint/2010/main" val="2581813920"/>
       </p:ext>
     </p:extLst>
   </p:cSld>
@@ -1118,8 +2363,8 @@
         </p:nvSpPr>
         <p:spPr>
           <a:xfrm>
-            <a:off x="838200" y="2190750"/>
-            <a:ext cx="5181600" cy="5221606"/>
+            <a:off x="942975" y="2190750"/>
+            <a:ext cx="5829300" cy="5221606"/>
           </a:xfrm>
         </p:spPr>
         <p:txBody>
@@ -1175,8 +2420,8 @@
         </p:nvSpPr>
         <p:spPr>
           <a:xfrm>
-            <a:off x="6172200" y="2190750"/>
-            <a:ext cx="5181600" cy="5221606"/>
+            <a:off x="6943725" y="2190750"/>
+            <a:ext cx="5829300" cy="5221606"/>
           </a:xfrm>
         </p:spPr>
         <p:txBody>
@@ -1288,7 +2533,7 @@
     </p:spTree>
     <p:extLst>
       <p:ext uri="{BB962C8B-B14F-4D97-AF65-F5344CB8AC3E}">
-        <p14:creationId xmlns:p14="http://schemas.microsoft.com/office/powerpoint/2010/main" val="1812917617"/>
+        <p14:creationId xmlns:p14="http://schemas.microsoft.com/office/powerpoint/2010/main" val="3740600110"/>
       </p:ext>
     </p:extLst>
   </p:cSld>
@@ -1327,8 +2572,8 @@
         </p:nvSpPr>
         <p:spPr>
           <a:xfrm>
-            <a:off x="839788" y="438152"/>
-            <a:ext cx="10515600" cy="1590676"/>
+            <a:off x="944762" y="438150"/>
+            <a:ext cx="11830050" cy="1590676"/>
           </a:xfrm>
         </p:spPr>
         <p:txBody>
@@ -1355,8 +2600,8 @@
         </p:nvSpPr>
         <p:spPr>
           <a:xfrm>
-            <a:off x="839789" y="2017396"/>
-            <a:ext cx="5157787" cy="988694"/>
+            <a:off x="944762" y="2017396"/>
+            <a:ext cx="5802510" cy="988694"/>
           </a:xfrm>
         </p:spPr>
         <p:txBody>
@@ -1364,39 +2609,39 @@
           <a:lstStyle>
             <a:lvl1pPr marL="0" indent="0">
               <a:buNone/>
-              <a:defRPr sz="2880" b="1"/>
+              <a:defRPr sz="2700" b="1"/>
             </a:lvl1pPr>
-            <a:lvl2pPr marL="548640" indent="0">
-              <a:buNone/>
-              <a:defRPr sz="2400" b="1"/>
+            <a:lvl2pPr marL="514350" indent="0">
+              <a:buNone/>
+              <a:defRPr sz="2250" b="1"/>
             </a:lvl2pPr>
-            <a:lvl3pPr marL="1097280" indent="0">
-              <a:buNone/>
-              <a:defRPr sz="2160" b="1"/>
+            <a:lvl3pPr marL="1028700" indent="0">
+              <a:buNone/>
+              <a:defRPr sz="2025" b="1"/>
             </a:lvl3pPr>
-            <a:lvl4pPr marL="1645920" indent="0">
-              <a:buNone/>
-              <a:defRPr sz="1920" b="1"/>
+            <a:lvl4pPr marL="1543050" indent="0">
+              <a:buNone/>
+              <a:defRPr sz="1800" b="1"/>
             </a:lvl4pPr>
-            <a:lvl5pPr marL="2194560" indent="0">
-              <a:buNone/>
-              <a:defRPr sz="1920" b="1"/>
+            <a:lvl5pPr marL="2057400" indent="0">
+              <a:buNone/>
+              <a:defRPr sz="1800" b="1"/>
             </a:lvl5pPr>
-            <a:lvl6pPr marL="2743200" indent="0">
-              <a:buNone/>
-              <a:defRPr sz="1920" b="1"/>
+            <a:lvl6pPr marL="2571750" indent="0">
+              <a:buNone/>
+              <a:defRPr sz="1800" b="1"/>
             </a:lvl6pPr>
-            <a:lvl7pPr marL="3291840" indent="0">
-              <a:buNone/>
-              <a:defRPr sz="1920" b="1"/>
+            <a:lvl7pPr marL="3086100" indent="0">
+              <a:buNone/>
+              <a:defRPr sz="1800" b="1"/>
             </a:lvl7pPr>
-            <a:lvl8pPr marL="3840480" indent="0">
-              <a:buNone/>
-              <a:defRPr sz="1920" b="1"/>
+            <a:lvl8pPr marL="3600450" indent="0">
+              <a:buNone/>
+              <a:defRPr sz="1800" b="1"/>
             </a:lvl8pPr>
-            <a:lvl9pPr marL="4389120" indent="0">
-              <a:buNone/>
-              <a:defRPr sz="1920" b="1"/>
+            <a:lvl9pPr marL="4114800" indent="0">
+              <a:buNone/>
+              <a:defRPr sz="1800" b="1"/>
             </a:lvl9pPr>
           </a:lstStyle>
           <a:p>
@@ -1420,8 +2665,8 @@
         </p:nvSpPr>
         <p:spPr>
           <a:xfrm>
-            <a:off x="839789" y="3006090"/>
-            <a:ext cx="5157787" cy="4421506"/>
+            <a:off x="944762" y="3006090"/>
+            <a:ext cx="5802510" cy="4421506"/>
           </a:xfrm>
         </p:spPr>
         <p:txBody>
@@ -1477,8 +2722,8 @@
         </p:nvSpPr>
         <p:spPr>
           <a:xfrm>
-            <a:off x="6172201" y="2017396"/>
-            <a:ext cx="5183188" cy="988694"/>
+            <a:off x="6943725" y="2017396"/>
+            <a:ext cx="5831087" cy="988694"/>
           </a:xfrm>
         </p:spPr>
         <p:txBody>
@@ -1486,39 +2731,39 @@
           <a:lstStyle>
             <a:lvl1pPr marL="0" indent="0">
               <a:buNone/>
-              <a:defRPr sz="2880" b="1"/>
+              <a:defRPr sz="2700" b="1"/>
             </a:lvl1pPr>
-            <a:lvl2pPr marL="548640" indent="0">
-              <a:buNone/>
-              <a:defRPr sz="2400" b="1"/>
+            <a:lvl2pPr marL="514350" indent="0">
+              <a:buNone/>
+              <a:defRPr sz="2250" b="1"/>
             </a:lvl2pPr>
-            <a:lvl3pPr marL="1097280" indent="0">
-              <a:buNone/>
-              <a:defRPr sz="2160" b="1"/>
+            <a:lvl3pPr marL="1028700" indent="0">
+              <a:buNone/>
+              <a:defRPr sz="2025" b="1"/>
             </a:lvl3pPr>
-            <a:lvl4pPr marL="1645920" indent="0">
-              <a:buNone/>
-              <a:defRPr sz="1920" b="1"/>
+            <a:lvl4pPr marL="1543050" indent="0">
+              <a:buNone/>
+              <a:defRPr sz="1800" b="1"/>
             </a:lvl4pPr>
-            <a:lvl5pPr marL="2194560" indent="0">
-              <a:buNone/>
-              <a:defRPr sz="1920" b="1"/>
+            <a:lvl5pPr marL="2057400" indent="0">
+              <a:buNone/>
+              <a:defRPr sz="1800" b="1"/>
             </a:lvl5pPr>
-            <a:lvl6pPr marL="2743200" indent="0">
-              <a:buNone/>
-              <a:defRPr sz="1920" b="1"/>
+            <a:lvl6pPr marL="2571750" indent="0">
+              <a:buNone/>
+              <a:defRPr sz="1800" b="1"/>
             </a:lvl6pPr>
-            <a:lvl7pPr marL="3291840" indent="0">
-              <a:buNone/>
-              <a:defRPr sz="1920" b="1"/>
+            <a:lvl7pPr marL="3086100" indent="0">
+              <a:buNone/>
+              <a:defRPr sz="1800" b="1"/>
             </a:lvl7pPr>
-            <a:lvl8pPr marL="3840480" indent="0">
-              <a:buNone/>
-              <a:defRPr sz="1920" b="1"/>
+            <a:lvl8pPr marL="3600450" indent="0">
+              <a:buNone/>
+              <a:defRPr sz="1800" b="1"/>
             </a:lvl8pPr>
-            <a:lvl9pPr marL="4389120" indent="0">
-              <a:buNone/>
-              <a:defRPr sz="1920" b="1"/>
+            <a:lvl9pPr marL="4114800" indent="0">
+              <a:buNone/>
+              <a:defRPr sz="1800" b="1"/>
             </a:lvl9pPr>
           </a:lstStyle>
           <a:p>
@@ -1542,8 +2787,8 @@
         </p:nvSpPr>
         <p:spPr>
           <a:xfrm>
-            <a:off x="6172201" y="3006090"/>
-            <a:ext cx="5183188" cy="4421506"/>
+            <a:off x="6943725" y="3006090"/>
+            <a:ext cx="5831087" cy="4421506"/>
           </a:xfrm>
         </p:spPr>
         <p:txBody>
@@ -1655,7 +2900,7 @@
     </p:spTree>
     <p:extLst>
       <p:ext uri="{BB962C8B-B14F-4D97-AF65-F5344CB8AC3E}">
-        <p14:creationId xmlns:p14="http://schemas.microsoft.com/office/powerpoint/2010/main" val="152299624"/>
+        <p14:creationId xmlns:p14="http://schemas.microsoft.com/office/powerpoint/2010/main" val="1708053659"/>
       </p:ext>
     </p:extLst>
   </p:cSld>
@@ -1773,7 +3018,7 @@
     </p:spTree>
     <p:extLst>
       <p:ext uri="{BB962C8B-B14F-4D97-AF65-F5344CB8AC3E}">
-        <p14:creationId xmlns:p14="http://schemas.microsoft.com/office/powerpoint/2010/main" val="4189318809"/>
+        <p14:creationId xmlns:p14="http://schemas.microsoft.com/office/powerpoint/2010/main" val="1755475003"/>
       </p:ext>
     </p:extLst>
   </p:cSld>
@@ -1868,7 +3113,7 @@
     </p:spTree>
     <p:extLst>
       <p:ext uri="{BB962C8B-B14F-4D97-AF65-F5344CB8AC3E}">
-        <p14:creationId xmlns:p14="http://schemas.microsoft.com/office/powerpoint/2010/main" val="561505421"/>
+        <p14:creationId xmlns:p14="http://schemas.microsoft.com/office/powerpoint/2010/main" val="2175904302"/>
       </p:ext>
     </p:extLst>
   </p:cSld>
@@ -1907,15 +3152,15 @@
         </p:nvSpPr>
         <p:spPr>
           <a:xfrm>
-            <a:off x="839788" y="548640"/>
-            <a:ext cx="3932237" cy="1920240"/>
+            <a:off x="944762" y="548640"/>
+            <a:ext cx="4423767" cy="1920240"/>
           </a:xfrm>
         </p:spPr>
         <p:txBody>
           <a:bodyPr anchor="b"/>
           <a:lstStyle>
             <a:lvl1pPr>
-              <a:defRPr sz="3840"/>
+              <a:defRPr sz="3600"/>
             </a:lvl1pPr>
           </a:lstStyle>
           <a:p>
@@ -1939,39 +3184,39 @@
         </p:nvSpPr>
         <p:spPr>
           <a:xfrm>
-            <a:off x="5183188" y="1184912"/>
-            <a:ext cx="6172200" cy="5848350"/>
+            <a:off x="5831087" y="1184911"/>
+            <a:ext cx="6943725" cy="5848350"/>
           </a:xfrm>
         </p:spPr>
         <p:txBody>
           <a:bodyPr/>
           <a:lstStyle>
             <a:lvl1pPr>
-              <a:defRPr sz="3840"/>
+              <a:defRPr sz="3600"/>
             </a:lvl1pPr>
             <a:lvl2pPr>
-              <a:defRPr sz="3360"/>
+              <a:defRPr sz="3150"/>
             </a:lvl2pPr>
             <a:lvl3pPr>
-              <a:defRPr sz="2880"/>
+              <a:defRPr sz="2700"/>
             </a:lvl3pPr>
             <a:lvl4pPr>
-              <a:defRPr sz="2400"/>
+              <a:defRPr sz="2250"/>
             </a:lvl4pPr>
             <a:lvl5pPr>
-              <a:defRPr sz="2400"/>
+              <a:defRPr sz="2250"/>
             </a:lvl5pPr>
             <a:lvl6pPr>
-              <a:defRPr sz="2400"/>
+              <a:defRPr sz="2250"/>
             </a:lvl6pPr>
             <a:lvl7pPr>
-              <a:defRPr sz="2400"/>
+              <a:defRPr sz="2250"/>
             </a:lvl7pPr>
             <a:lvl8pPr>
-              <a:defRPr sz="2400"/>
+              <a:defRPr sz="2250"/>
             </a:lvl8pPr>
             <a:lvl9pPr>
-              <a:defRPr sz="2400"/>
+              <a:defRPr sz="2250"/>
             </a:lvl9pPr>
           </a:lstStyle>
           <a:p>
@@ -2024,8 +3269,8 @@
         </p:nvSpPr>
         <p:spPr>
           <a:xfrm>
-            <a:off x="839788" y="2468880"/>
-            <a:ext cx="3932237" cy="4573906"/>
+            <a:off x="944762" y="2468880"/>
+            <a:ext cx="4423767" cy="4573906"/>
           </a:xfrm>
         </p:spPr>
         <p:txBody>
@@ -2033,39 +3278,39 @@
           <a:lstStyle>
             <a:lvl1pPr marL="0" indent="0">
               <a:buNone/>
-              <a:defRPr sz="1920"/>
+              <a:defRPr sz="1800"/>
             </a:lvl1pPr>
-            <a:lvl2pPr marL="548640" indent="0">
-              <a:buNone/>
-              <a:defRPr sz="1680"/>
+            <a:lvl2pPr marL="514350" indent="0">
+              <a:buNone/>
+              <a:defRPr sz="1575"/>
             </a:lvl2pPr>
-            <a:lvl3pPr marL="1097280" indent="0">
-              <a:buNone/>
-              <a:defRPr sz="1440"/>
+            <a:lvl3pPr marL="1028700" indent="0">
+              <a:buNone/>
+              <a:defRPr sz="1350"/>
             </a:lvl3pPr>
-            <a:lvl4pPr marL="1645920" indent="0">
-              <a:buNone/>
-              <a:defRPr sz="1200"/>
+            <a:lvl4pPr marL="1543050" indent="0">
+              <a:buNone/>
+              <a:defRPr sz="1125"/>
             </a:lvl4pPr>
-            <a:lvl5pPr marL="2194560" indent="0">
-              <a:buNone/>
-              <a:defRPr sz="1200"/>
+            <a:lvl5pPr marL="2057400" indent="0">
+              <a:buNone/>
+              <a:defRPr sz="1125"/>
             </a:lvl5pPr>
-            <a:lvl6pPr marL="2743200" indent="0">
-              <a:buNone/>
-              <a:defRPr sz="1200"/>
+            <a:lvl6pPr marL="2571750" indent="0">
+              <a:buNone/>
+              <a:defRPr sz="1125"/>
             </a:lvl6pPr>
-            <a:lvl7pPr marL="3291840" indent="0">
-              <a:buNone/>
-              <a:defRPr sz="1200"/>
+            <a:lvl7pPr marL="3086100" indent="0">
+              <a:buNone/>
+              <a:defRPr sz="1125"/>
             </a:lvl7pPr>
-            <a:lvl8pPr marL="3840480" indent="0">
-              <a:buNone/>
-              <a:defRPr sz="1200"/>
+            <a:lvl8pPr marL="3600450" indent="0">
+              <a:buNone/>
+              <a:defRPr sz="1125"/>
             </a:lvl8pPr>
-            <a:lvl9pPr marL="4389120" indent="0">
-              <a:buNone/>
-              <a:defRPr sz="1200"/>
+            <a:lvl9pPr marL="4114800" indent="0">
+              <a:buNone/>
+              <a:defRPr sz="1125"/>
             </a:lvl9pPr>
           </a:lstStyle>
           <a:p>
@@ -2145,7 +3390,7 @@
     </p:spTree>
     <p:extLst>
       <p:ext uri="{BB962C8B-B14F-4D97-AF65-F5344CB8AC3E}">
-        <p14:creationId xmlns:p14="http://schemas.microsoft.com/office/powerpoint/2010/main" val="2330909102"/>
+        <p14:creationId xmlns:p14="http://schemas.microsoft.com/office/powerpoint/2010/main" val="405350708"/>
       </p:ext>
     </p:extLst>
   </p:cSld>
@@ -2184,15 +3429,15 @@
         </p:nvSpPr>
         <p:spPr>
           <a:xfrm>
-            <a:off x="839788" y="548640"/>
-            <a:ext cx="3932237" cy="1920240"/>
+            <a:off x="944762" y="548640"/>
+            <a:ext cx="4423767" cy="1920240"/>
           </a:xfrm>
         </p:spPr>
         <p:txBody>
           <a:bodyPr anchor="b"/>
           <a:lstStyle>
             <a:lvl1pPr>
-              <a:defRPr sz="3840"/>
+              <a:defRPr sz="3600"/>
             </a:lvl1pPr>
           </a:lstStyle>
           <a:p>
@@ -2216,8 +3461,8 @@
         </p:nvSpPr>
         <p:spPr>
           <a:xfrm>
-            <a:off x="5183188" y="1184912"/>
-            <a:ext cx="6172200" cy="5848350"/>
+            <a:off x="5831087" y="1184911"/>
+            <a:ext cx="6943725" cy="5848350"/>
           </a:xfrm>
         </p:spPr>
         <p:txBody>
@@ -2225,39 +3470,39 @@
           <a:lstStyle>
             <a:lvl1pPr marL="0" indent="0">
               <a:buNone/>
-              <a:defRPr sz="3840"/>
+              <a:defRPr sz="3600"/>
             </a:lvl1pPr>
-            <a:lvl2pPr marL="548640" indent="0">
-              <a:buNone/>
-              <a:defRPr sz="3360"/>
+            <a:lvl2pPr marL="514350" indent="0">
+              <a:buNone/>
+              <a:defRPr sz="3150"/>
             </a:lvl2pPr>
-            <a:lvl3pPr marL="1097280" indent="0">
-              <a:buNone/>
-              <a:defRPr sz="2880"/>
+            <a:lvl3pPr marL="1028700" indent="0">
+              <a:buNone/>
+              <a:defRPr sz="2700"/>
             </a:lvl3pPr>
-            <a:lvl4pPr marL="1645920" indent="0">
-              <a:buNone/>
-              <a:defRPr sz="2400"/>
+            <a:lvl4pPr marL="1543050" indent="0">
+              <a:buNone/>
+              <a:defRPr sz="2250"/>
             </a:lvl4pPr>
-            <a:lvl5pPr marL="2194560" indent="0">
-              <a:buNone/>
-              <a:defRPr sz="2400"/>
+            <a:lvl5pPr marL="2057400" indent="0">
+              <a:buNone/>
+              <a:defRPr sz="2250"/>
             </a:lvl5pPr>
-            <a:lvl6pPr marL="2743200" indent="0">
-              <a:buNone/>
-              <a:defRPr sz="2400"/>
+            <a:lvl6pPr marL="2571750" indent="0">
+              <a:buNone/>
+              <a:defRPr sz="2250"/>
             </a:lvl6pPr>
-            <a:lvl7pPr marL="3291840" indent="0">
-              <a:buNone/>
-              <a:defRPr sz="2400"/>
+            <a:lvl7pPr marL="3086100" indent="0">
+              <a:buNone/>
+              <a:defRPr sz="2250"/>
             </a:lvl7pPr>
-            <a:lvl8pPr marL="3840480" indent="0">
-              <a:buNone/>
-              <a:defRPr sz="2400"/>
+            <a:lvl8pPr marL="3600450" indent="0">
+              <a:buNone/>
+              <a:defRPr sz="2250"/>
             </a:lvl8pPr>
-            <a:lvl9pPr marL="4389120" indent="0">
-              <a:buNone/>
-              <a:defRPr sz="2400"/>
+            <a:lvl9pPr marL="4114800" indent="0">
+              <a:buNone/>
+              <a:defRPr sz="2250"/>
             </a:lvl9pPr>
           </a:lstStyle>
           <a:p>
@@ -2281,8 +3526,8 @@
         </p:nvSpPr>
         <p:spPr>
           <a:xfrm>
-            <a:off x="839788" y="2468880"/>
-            <a:ext cx="3932237" cy="4573906"/>
+            <a:off x="944762" y="2468880"/>
+            <a:ext cx="4423767" cy="4573906"/>
           </a:xfrm>
         </p:spPr>
         <p:txBody>
@@ -2290,39 +3535,39 @@
           <a:lstStyle>
             <a:lvl1pPr marL="0" indent="0">
               <a:buNone/>
-              <a:defRPr sz="1920"/>
+              <a:defRPr sz="1800"/>
             </a:lvl1pPr>
-            <a:lvl2pPr marL="548640" indent="0">
-              <a:buNone/>
-              <a:defRPr sz="1680"/>
+            <a:lvl2pPr marL="514350" indent="0">
+              <a:buNone/>
+              <a:defRPr sz="1575"/>
             </a:lvl2pPr>
-            <a:lvl3pPr marL="1097280" indent="0">
-              <a:buNone/>
-              <a:defRPr sz="1440"/>
+            <a:lvl3pPr marL="1028700" indent="0">
+              <a:buNone/>
+              <a:defRPr sz="1350"/>
             </a:lvl3pPr>
-            <a:lvl4pPr marL="1645920" indent="0">
-              <a:buNone/>
-              <a:defRPr sz="1200"/>
+            <a:lvl4pPr marL="1543050" indent="0">
+              <a:buNone/>
+              <a:defRPr sz="1125"/>
             </a:lvl4pPr>
-            <a:lvl5pPr marL="2194560" indent="0">
-              <a:buNone/>
-              <a:defRPr sz="1200"/>
+            <a:lvl5pPr marL="2057400" indent="0">
+              <a:buNone/>
+              <a:defRPr sz="1125"/>
             </a:lvl5pPr>
-            <a:lvl6pPr marL="2743200" indent="0">
-              <a:buNone/>
-              <a:defRPr sz="1200"/>
+            <a:lvl6pPr marL="2571750" indent="0">
+              <a:buNone/>
+              <a:defRPr sz="1125"/>
             </a:lvl6pPr>
-            <a:lvl7pPr marL="3291840" indent="0">
-              <a:buNone/>
-              <a:defRPr sz="1200"/>
+            <a:lvl7pPr marL="3086100" indent="0">
+              <a:buNone/>
+              <a:defRPr sz="1125"/>
             </a:lvl7pPr>
-            <a:lvl8pPr marL="3840480" indent="0">
-              <a:buNone/>
-              <a:defRPr sz="1200"/>
+            <a:lvl8pPr marL="3600450" indent="0">
+              <a:buNone/>
+              <a:defRPr sz="1125"/>
             </a:lvl8pPr>
-            <a:lvl9pPr marL="4389120" indent="0">
-              <a:buNone/>
-              <a:defRPr sz="1200"/>
+            <a:lvl9pPr marL="4114800" indent="0">
+              <a:buNone/>
+              <a:defRPr sz="1125"/>
             </a:lvl9pPr>
           </a:lstStyle>
           <a:p>
@@ -2402,7 +3647,7 @@
     </p:spTree>
     <p:extLst>
       <p:ext uri="{BB962C8B-B14F-4D97-AF65-F5344CB8AC3E}">
-        <p14:creationId xmlns:p14="http://schemas.microsoft.com/office/powerpoint/2010/main" val="268978110"/>
+        <p14:creationId xmlns:p14="http://schemas.microsoft.com/office/powerpoint/2010/main" val="1542800646"/>
       </p:ext>
     </p:extLst>
   </p:cSld>
@@ -2446,8 +3691,8 @@
         </p:nvSpPr>
         <p:spPr>
           <a:xfrm>
-            <a:off x="838200" y="438152"/>
-            <a:ext cx="10515600" cy="1590676"/>
+            <a:off x="942975" y="438150"/>
+            <a:ext cx="11830050" cy="1590676"/>
           </a:xfrm>
           <a:prstGeom prst="rect">
             <a:avLst/>
@@ -2479,8 +3724,8 @@
         </p:nvSpPr>
         <p:spPr>
           <a:xfrm>
-            <a:off x="838200" y="2190750"/>
-            <a:ext cx="10515600" cy="5221606"/>
+            <a:off x="942975" y="2190750"/>
+            <a:ext cx="11830050" cy="5221606"/>
           </a:xfrm>
           <a:prstGeom prst="rect">
             <a:avLst/>
@@ -2541,8 +3786,8 @@
         </p:nvSpPr>
         <p:spPr>
           <a:xfrm>
-            <a:off x="838200" y="7627622"/>
-            <a:ext cx="2743200" cy="438150"/>
+            <a:off x="942975" y="7627621"/>
+            <a:ext cx="3086100" cy="438150"/>
           </a:xfrm>
           <a:prstGeom prst="rect">
             <a:avLst/>
@@ -2552,7 +3797,7 @@
           <a:bodyPr vert="horz" lIns="91440" tIns="45720" rIns="91440" bIns="45720" rtlCol="0" anchor="ctr"/>
           <a:lstStyle>
             <a:lvl1pPr algn="l">
-              <a:defRPr sz="1440">
+              <a:defRPr sz="1350">
                 <a:solidFill>
                   <a:schemeClr val="tx1">
                     <a:tint val="82000"/>
@@ -2582,8 +3827,8 @@
         </p:nvSpPr>
         <p:spPr>
           <a:xfrm>
-            <a:off x="4038600" y="7627622"/>
-            <a:ext cx="4114800" cy="438150"/>
+            <a:off x="4543425" y="7627621"/>
+            <a:ext cx="4629150" cy="438150"/>
           </a:xfrm>
           <a:prstGeom prst="rect">
             <a:avLst/>
@@ -2593,7 +3838,7 @@
           <a:bodyPr vert="horz" lIns="91440" tIns="45720" rIns="91440" bIns="45720" rtlCol="0" anchor="ctr"/>
           <a:lstStyle>
             <a:lvl1pPr algn="ctr">
-              <a:defRPr sz="1440">
+              <a:defRPr sz="1350">
                 <a:solidFill>
                   <a:schemeClr val="tx1">
                     <a:tint val="82000"/>
@@ -2619,8 +3864,8 @@
         </p:nvSpPr>
         <p:spPr>
           <a:xfrm>
-            <a:off x="8610600" y="7627622"/>
-            <a:ext cx="2743200" cy="438150"/>
+            <a:off x="9686925" y="7627621"/>
+            <a:ext cx="3086100" cy="438150"/>
           </a:xfrm>
           <a:prstGeom prst="rect">
             <a:avLst/>
@@ -2630,7 +3875,7 @@
           <a:bodyPr vert="horz" lIns="91440" tIns="45720" rIns="91440" bIns="45720" rtlCol="0" anchor="ctr"/>
           <a:lstStyle>
             <a:lvl1pPr algn="r">
-              <a:defRPr sz="1440">
+              <a:defRPr sz="1350">
                 <a:solidFill>
                   <a:schemeClr val="tx1">
                     <a:tint val="82000"/>
@@ -2651,27 +3896,27 @@
     </p:spTree>
     <p:extLst>
       <p:ext uri="{BB962C8B-B14F-4D97-AF65-F5344CB8AC3E}">
-        <p14:creationId xmlns:p14="http://schemas.microsoft.com/office/powerpoint/2010/main" val="2353312228"/>
+        <p14:creationId xmlns:p14="http://schemas.microsoft.com/office/powerpoint/2010/main" val="2288919293"/>
       </p:ext>
     </p:extLst>
   </p:cSld>
   <p:clrMap bg1="lt1" tx1="dk1" bg2="lt2" tx2="dk2" accent1="accent1" accent2="accent2" accent3="accent3" accent4="accent4" accent5="accent5" accent6="accent6" hlink="hlink" folHlink="folHlink"/>
   <p:sldLayoutIdLst>
-    <p:sldLayoutId id="2147483661" r:id="rId1"/>
-    <p:sldLayoutId id="2147483662" r:id="rId2"/>
-    <p:sldLayoutId id="2147483663" r:id="rId3"/>
-    <p:sldLayoutId id="2147483664" r:id="rId4"/>
-    <p:sldLayoutId id="2147483665" r:id="rId5"/>
-    <p:sldLayoutId id="2147483666" r:id="rId6"/>
-    <p:sldLayoutId id="2147483667" r:id="rId7"/>
-    <p:sldLayoutId id="2147483668" r:id="rId8"/>
-    <p:sldLayoutId id="2147483669" r:id="rId9"/>
-    <p:sldLayoutId id="2147483670" r:id="rId10"/>
-    <p:sldLayoutId id="2147483671" r:id="rId11"/>
+    <p:sldLayoutId id="2147483685" r:id="rId1"/>
+    <p:sldLayoutId id="2147483686" r:id="rId2"/>
+    <p:sldLayoutId id="2147483687" r:id="rId3"/>
+    <p:sldLayoutId id="2147483688" r:id="rId4"/>
+    <p:sldLayoutId id="2147483689" r:id="rId5"/>
+    <p:sldLayoutId id="2147483690" r:id="rId6"/>
+    <p:sldLayoutId id="2147483691" r:id="rId7"/>
+    <p:sldLayoutId id="2147483692" r:id="rId8"/>
+    <p:sldLayoutId id="2147483693" r:id="rId9"/>
+    <p:sldLayoutId id="2147483694" r:id="rId10"/>
+    <p:sldLayoutId id="2147483695" r:id="rId11"/>
   </p:sldLayoutIdLst>
   <p:txStyles>
     <p:titleStyle>
-      <a:lvl1pPr algn="l" defTabSz="1097280" rtl="0" eaLnBrk="1" latinLnBrk="0" hangingPunct="1">
+      <a:lvl1pPr algn="l" defTabSz="1028700" rtl="0" eaLnBrk="1" latinLnBrk="0" hangingPunct="1">
         <a:lnSpc>
           <a:spcPct val="90000"/>
         </a:lnSpc>
@@ -2679,7 +3924,7 @@
           <a:spcPct val="0"/>
         </a:spcBef>
         <a:buNone/>
-        <a:defRPr sz="5280" kern="1200">
+        <a:defRPr sz="4950" kern="1200">
           <a:solidFill>
             <a:schemeClr val="tx1"/>
           </a:solidFill>
@@ -2690,16 +3935,16 @@
       </a:lvl1pPr>
     </p:titleStyle>
     <p:bodyStyle>
-      <a:lvl1pPr marL="274320" indent="-274320" algn="l" defTabSz="1097280" rtl="0" eaLnBrk="1" latinLnBrk="0" hangingPunct="1">
+      <a:lvl1pPr marL="257175" indent="-257175" algn="l" defTabSz="1028700" rtl="0" eaLnBrk="1" latinLnBrk="0" hangingPunct="1">
         <a:lnSpc>
           <a:spcPct val="90000"/>
         </a:lnSpc>
         <a:spcBef>
-          <a:spcPts val="1200"/>
+          <a:spcPts val="1125"/>
         </a:spcBef>
         <a:buFont typeface="Arial" panose="020B0604020202020204" pitchFamily="34" charset="0"/>
         <a:buChar char="•"/>
-        <a:defRPr sz="3360" kern="1200">
+        <a:defRPr sz="3150" kern="1200">
           <a:solidFill>
             <a:schemeClr val="tx1"/>
           </a:solidFill>
@@ -2708,16 +3953,16 @@
           <a:cs typeface="+mn-cs"/>
         </a:defRPr>
       </a:lvl1pPr>
-      <a:lvl2pPr marL="822960" indent="-274320" algn="l" defTabSz="1097280" rtl="0" eaLnBrk="1" latinLnBrk="0" hangingPunct="1">
+      <a:lvl2pPr marL="771525" indent="-257175" algn="l" defTabSz="1028700" rtl="0" eaLnBrk="1" latinLnBrk="0" hangingPunct="1">
         <a:lnSpc>
           <a:spcPct val="90000"/>
         </a:lnSpc>
         <a:spcBef>
-          <a:spcPts val="600"/>
+          <a:spcPts val="563"/>
         </a:spcBef>
         <a:buFont typeface="Arial" panose="020B0604020202020204" pitchFamily="34" charset="0"/>
         <a:buChar char="•"/>
-        <a:defRPr sz="2880" kern="1200">
+        <a:defRPr sz="2700" kern="1200">
           <a:solidFill>
             <a:schemeClr val="tx1"/>
           </a:solidFill>
@@ -2726,16 +3971,16 @@
           <a:cs typeface="+mn-cs"/>
         </a:defRPr>
       </a:lvl2pPr>
-      <a:lvl3pPr marL="1371600" indent="-274320" algn="l" defTabSz="1097280" rtl="0" eaLnBrk="1" latinLnBrk="0" hangingPunct="1">
+      <a:lvl3pPr marL="1285875" indent="-257175" algn="l" defTabSz="1028700" rtl="0" eaLnBrk="1" latinLnBrk="0" hangingPunct="1">
         <a:lnSpc>
           <a:spcPct val="90000"/>
         </a:lnSpc>
         <a:spcBef>
-          <a:spcPts val="600"/>
+          <a:spcPts val="563"/>
         </a:spcBef>
         <a:buFont typeface="Arial" panose="020B0604020202020204" pitchFamily="34" charset="0"/>
         <a:buChar char="•"/>
-        <a:defRPr sz="2400" kern="1200">
+        <a:defRPr sz="2250" kern="1200">
           <a:solidFill>
             <a:schemeClr val="tx1"/>
           </a:solidFill>
@@ -2744,16 +3989,16 @@
           <a:cs typeface="+mn-cs"/>
         </a:defRPr>
       </a:lvl3pPr>
-      <a:lvl4pPr marL="1920240" indent="-274320" algn="l" defTabSz="1097280" rtl="0" eaLnBrk="1" latinLnBrk="0" hangingPunct="1">
+      <a:lvl4pPr marL="1800225" indent="-257175" algn="l" defTabSz="1028700" rtl="0" eaLnBrk="1" latinLnBrk="0" hangingPunct="1">
         <a:lnSpc>
           <a:spcPct val="90000"/>
         </a:lnSpc>
         <a:spcBef>
-          <a:spcPts val="600"/>
+          <a:spcPts val="563"/>
         </a:spcBef>
         <a:buFont typeface="Arial" panose="020B0604020202020204" pitchFamily="34" charset="0"/>
         <a:buChar char="•"/>
-        <a:defRPr sz="2160" kern="1200">
+        <a:defRPr sz="2025" kern="1200">
           <a:solidFill>
             <a:schemeClr val="tx1"/>
           </a:solidFill>
@@ -2762,16 +4007,16 @@
           <a:cs typeface="+mn-cs"/>
         </a:defRPr>
       </a:lvl4pPr>
-      <a:lvl5pPr marL="2468880" indent="-274320" algn="l" defTabSz="1097280" rtl="0" eaLnBrk="1" latinLnBrk="0" hangingPunct="1">
+      <a:lvl5pPr marL="2314575" indent="-257175" algn="l" defTabSz="1028700" rtl="0" eaLnBrk="1" latinLnBrk="0" hangingPunct="1">
         <a:lnSpc>
           <a:spcPct val="90000"/>
         </a:lnSpc>
         <a:spcBef>
-          <a:spcPts val="600"/>
+          <a:spcPts val="563"/>
         </a:spcBef>
         <a:buFont typeface="Arial" panose="020B0604020202020204" pitchFamily="34" charset="0"/>
         <a:buChar char="•"/>
-        <a:defRPr sz="2160" kern="1200">
+        <a:defRPr sz="2025" kern="1200">
           <a:solidFill>
             <a:schemeClr val="tx1"/>
           </a:solidFill>
@@ -2780,16 +4025,16 @@
           <a:cs typeface="+mn-cs"/>
         </a:defRPr>
       </a:lvl5pPr>
-      <a:lvl6pPr marL="3017520" indent="-274320" algn="l" defTabSz="1097280" rtl="0" eaLnBrk="1" latinLnBrk="0" hangingPunct="1">
+      <a:lvl6pPr marL="2828925" indent="-257175" algn="l" defTabSz="1028700" rtl="0" eaLnBrk="1" latinLnBrk="0" hangingPunct="1">
         <a:lnSpc>
           <a:spcPct val="90000"/>
         </a:lnSpc>
         <a:spcBef>
-          <a:spcPts val="600"/>
+          <a:spcPts val="563"/>
         </a:spcBef>
         <a:buFont typeface="Arial" panose="020B0604020202020204" pitchFamily="34" charset="0"/>
         <a:buChar char="•"/>
-        <a:defRPr sz="2160" kern="1200">
+        <a:defRPr sz="2025" kern="1200">
           <a:solidFill>
             <a:schemeClr val="tx1"/>
           </a:solidFill>
@@ -2798,16 +4043,16 @@
           <a:cs typeface="+mn-cs"/>
         </a:defRPr>
       </a:lvl6pPr>
-      <a:lvl7pPr marL="3566160" indent="-274320" algn="l" defTabSz="1097280" rtl="0" eaLnBrk="1" latinLnBrk="0" hangingPunct="1">
+      <a:lvl7pPr marL="3343275" indent="-257175" algn="l" defTabSz="1028700" rtl="0" eaLnBrk="1" latinLnBrk="0" hangingPunct="1">
         <a:lnSpc>
           <a:spcPct val="90000"/>
         </a:lnSpc>
         <a:spcBef>
-          <a:spcPts val="600"/>
+          <a:spcPts val="563"/>
         </a:spcBef>
         <a:buFont typeface="Arial" panose="020B0604020202020204" pitchFamily="34" charset="0"/>
         <a:buChar char="•"/>
-        <a:defRPr sz="2160" kern="1200">
+        <a:defRPr sz="2025" kern="1200">
           <a:solidFill>
             <a:schemeClr val="tx1"/>
           </a:solidFill>
@@ -2816,16 +4061,16 @@
           <a:cs typeface="+mn-cs"/>
         </a:defRPr>
       </a:lvl7pPr>
-      <a:lvl8pPr marL="4114800" indent="-274320" algn="l" defTabSz="1097280" rtl="0" eaLnBrk="1" latinLnBrk="0" hangingPunct="1">
+      <a:lvl8pPr marL="3857625" indent="-257175" algn="l" defTabSz="1028700" rtl="0" eaLnBrk="1" latinLnBrk="0" hangingPunct="1">
         <a:lnSpc>
           <a:spcPct val="90000"/>
         </a:lnSpc>
         <a:spcBef>
-          <a:spcPts val="600"/>
+          <a:spcPts val="563"/>
         </a:spcBef>
         <a:buFont typeface="Arial" panose="020B0604020202020204" pitchFamily="34" charset="0"/>
         <a:buChar char="•"/>
-        <a:defRPr sz="2160" kern="1200">
+        <a:defRPr sz="2025" kern="1200">
           <a:solidFill>
             <a:schemeClr val="tx1"/>
           </a:solidFill>
@@ -2834,16 +4079,16 @@
           <a:cs typeface="+mn-cs"/>
         </a:defRPr>
       </a:lvl8pPr>
-      <a:lvl9pPr marL="4663440" indent="-274320" algn="l" defTabSz="1097280" rtl="0" eaLnBrk="1" latinLnBrk="0" hangingPunct="1">
+      <a:lvl9pPr marL="4371975" indent="-257175" algn="l" defTabSz="1028700" rtl="0" eaLnBrk="1" latinLnBrk="0" hangingPunct="1">
         <a:lnSpc>
           <a:spcPct val="90000"/>
         </a:lnSpc>
         <a:spcBef>
-          <a:spcPts val="600"/>
+          <a:spcPts val="563"/>
         </a:spcBef>
         <a:buFont typeface="Arial" panose="020B0604020202020204" pitchFamily="34" charset="0"/>
         <a:buChar char="•"/>
-        <a:defRPr sz="2160" kern="1200">
+        <a:defRPr sz="2025" kern="1200">
           <a:solidFill>
             <a:schemeClr val="tx1"/>
           </a:solidFill>
@@ -2857,8 +4102,8 @@
       <a:defPPr>
         <a:defRPr lang="en-US"/>
       </a:defPPr>
-      <a:lvl1pPr marL="0" algn="l" defTabSz="1097280" rtl="0" eaLnBrk="1" latinLnBrk="0" hangingPunct="1">
-        <a:defRPr sz="2160" kern="1200">
+      <a:lvl1pPr marL="0" algn="l" defTabSz="1028700" rtl="0" eaLnBrk="1" latinLnBrk="0" hangingPunct="1">
+        <a:defRPr sz="2025" kern="1200">
           <a:solidFill>
             <a:schemeClr val="tx1"/>
           </a:solidFill>
@@ -2867,8 +4112,8 @@
           <a:cs typeface="+mn-cs"/>
         </a:defRPr>
       </a:lvl1pPr>
-      <a:lvl2pPr marL="548640" algn="l" defTabSz="1097280" rtl="0" eaLnBrk="1" latinLnBrk="0" hangingPunct="1">
-        <a:defRPr sz="2160" kern="1200">
+      <a:lvl2pPr marL="514350" algn="l" defTabSz="1028700" rtl="0" eaLnBrk="1" latinLnBrk="0" hangingPunct="1">
+        <a:defRPr sz="2025" kern="1200">
           <a:solidFill>
             <a:schemeClr val="tx1"/>
           </a:solidFill>
@@ -2877,8 +4122,8 @@
           <a:cs typeface="+mn-cs"/>
         </a:defRPr>
       </a:lvl2pPr>
-      <a:lvl3pPr marL="1097280" algn="l" defTabSz="1097280" rtl="0" eaLnBrk="1" latinLnBrk="0" hangingPunct="1">
-        <a:defRPr sz="2160" kern="1200">
+      <a:lvl3pPr marL="1028700" algn="l" defTabSz="1028700" rtl="0" eaLnBrk="1" latinLnBrk="0" hangingPunct="1">
+        <a:defRPr sz="2025" kern="1200">
           <a:solidFill>
             <a:schemeClr val="tx1"/>
           </a:solidFill>
@@ -2887,8 +4132,8 @@
           <a:cs typeface="+mn-cs"/>
         </a:defRPr>
       </a:lvl3pPr>
-      <a:lvl4pPr marL="1645920" algn="l" defTabSz="1097280" rtl="0" eaLnBrk="1" latinLnBrk="0" hangingPunct="1">
-        <a:defRPr sz="2160" kern="1200">
+      <a:lvl4pPr marL="1543050" algn="l" defTabSz="1028700" rtl="0" eaLnBrk="1" latinLnBrk="0" hangingPunct="1">
+        <a:defRPr sz="2025" kern="1200">
           <a:solidFill>
             <a:schemeClr val="tx1"/>
           </a:solidFill>
@@ -2897,8 +4142,8 @@
           <a:cs typeface="+mn-cs"/>
         </a:defRPr>
       </a:lvl4pPr>
-      <a:lvl5pPr marL="2194560" algn="l" defTabSz="1097280" rtl="0" eaLnBrk="1" latinLnBrk="0" hangingPunct="1">
-        <a:defRPr sz="2160" kern="1200">
+      <a:lvl5pPr marL="2057400" algn="l" defTabSz="1028700" rtl="0" eaLnBrk="1" latinLnBrk="0" hangingPunct="1">
+        <a:defRPr sz="2025" kern="1200">
           <a:solidFill>
             <a:schemeClr val="tx1"/>
           </a:solidFill>
@@ -2907,8 +4152,8 @@
           <a:cs typeface="+mn-cs"/>
         </a:defRPr>
       </a:lvl5pPr>
-      <a:lvl6pPr marL="2743200" algn="l" defTabSz="1097280" rtl="0" eaLnBrk="1" latinLnBrk="0" hangingPunct="1">
-        <a:defRPr sz="2160" kern="1200">
+      <a:lvl6pPr marL="2571750" algn="l" defTabSz="1028700" rtl="0" eaLnBrk="1" latinLnBrk="0" hangingPunct="1">
+        <a:defRPr sz="2025" kern="1200">
           <a:solidFill>
             <a:schemeClr val="tx1"/>
           </a:solidFill>
@@ -2917,8 +4162,8 @@
           <a:cs typeface="+mn-cs"/>
         </a:defRPr>
       </a:lvl6pPr>
-      <a:lvl7pPr marL="3291840" algn="l" defTabSz="1097280" rtl="0" eaLnBrk="1" latinLnBrk="0" hangingPunct="1">
-        <a:defRPr sz="2160" kern="1200">
+      <a:lvl7pPr marL="3086100" algn="l" defTabSz="1028700" rtl="0" eaLnBrk="1" latinLnBrk="0" hangingPunct="1">
+        <a:defRPr sz="2025" kern="1200">
           <a:solidFill>
             <a:schemeClr val="tx1"/>
           </a:solidFill>
@@ -2927,8 +4172,8 @@
           <a:cs typeface="+mn-cs"/>
         </a:defRPr>
       </a:lvl7pPr>
-      <a:lvl8pPr marL="3840480" algn="l" defTabSz="1097280" rtl="0" eaLnBrk="1" latinLnBrk="0" hangingPunct="1">
-        <a:defRPr sz="2160" kern="1200">
+      <a:lvl8pPr marL="3600450" algn="l" defTabSz="1028700" rtl="0" eaLnBrk="1" latinLnBrk="0" hangingPunct="1">
+        <a:defRPr sz="2025" kern="1200">
           <a:solidFill>
             <a:schemeClr val="tx1"/>
           </a:solidFill>
@@ -2937,8 +4182,8 @@
           <a:cs typeface="+mn-cs"/>
         </a:defRPr>
       </a:lvl8pPr>
-      <a:lvl9pPr marL="4389120" algn="l" defTabSz="1097280" rtl="0" eaLnBrk="1" latinLnBrk="0" hangingPunct="1">
-        <a:defRPr sz="2160" kern="1200">
+      <a:lvl9pPr marL="4114800" algn="l" defTabSz="1028700" rtl="0" eaLnBrk="1" latinLnBrk="0" hangingPunct="1">
+        <a:defRPr sz="2025" kern="1200">
           <a:solidFill>
             <a:schemeClr val="tx1"/>
           </a:solidFill>
@@ -2953,86 +4198,6 @@
 </file>
 
 <file path=ppt/slides/slide1.xml><?xml version="1.0" encoding="utf-8"?>
-<p:sld xmlns:a="http://schemas.openxmlformats.org/drawingml/2006/main" xmlns:r="http://schemas.openxmlformats.org/officeDocument/2006/relationships" xmlns:p="http://schemas.openxmlformats.org/presentationml/2006/main">
-  <p:cSld>
-    <p:spTree>
-      <p:nvGrpSpPr>
-        <p:cNvPr id="1" name=""/>
-        <p:cNvGrpSpPr/>
-        <p:nvPr/>
-      </p:nvGrpSpPr>
-      <p:grpSpPr>
-        <a:xfrm>
-          <a:off x="0" y="0"/>
-          <a:ext cx="0" cy="0"/>
-          <a:chOff x="0" y="0"/>
-          <a:chExt cx="0" cy="0"/>
-        </a:xfrm>
-      </p:grpSpPr>
-      <p:sp>
-        <p:nvSpPr>
-          <p:cNvPr id="2" name="Title 1">
-            <a:extLst>
-              <a:ext uri="{FF2B5EF4-FFF2-40B4-BE49-F238E27FC236}">
-                <a16:creationId xmlns:a16="http://schemas.microsoft.com/office/drawing/2014/main" id="{A6F0B007-9548-94A6-5AF9-D52949645D92}"/>
-              </a:ext>
-            </a:extLst>
-          </p:cNvPr>
-          <p:cNvSpPr>
-            <a:spLocks noGrp="1"/>
-          </p:cNvSpPr>
-          <p:nvPr>
-            <p:ph type="ctrTitle"/>
-          </p:nvPr>
-        </p:nvSpPr>
-        <p:spPr/>
-        <p:txBody>
-          <a:bodyPr/>
-          <a:lstStyle/>
-          <a:p>
-            <a:endParaRPr lang="en-US"/>
-          </a:p>
-        </p:txBody>
-      </p:sp>
-      <p:sp>
-        <p:nvSpPr>
-          <p:cNvPr id="3" name="Subtitle 2">
-            <a:extLst>
-              <a:ext uri="{FF2B5EF4-FFF2-40B4-BE49-F238E27FC236}">
-                <a16:creationId xmlns:a16="http://schemas.microsoft.com/office/drawing/2014/main" id="{AB518897-5868-4945-8CE3-4720EFBEF08D}"/>
-              </a:ext>
-            </a:extLst>
-          </p:cNvPr>
-          <p:cNvSpPr>
-            <a:spLocks noGrp="1"/>
-          </p:cNvSpPr>
-          <p:nvPr>
-            <p:ph type="subTitle" idx="1"/>
-          </p:nvPr>
-        </p:nvSpPr>
-        <p:spPr/>
-        <p:txBody>
-          <a:bodyPr/>
-          <a:lstStyle/>
-          <a:p>
-            <a:endParaRPr lang="en-US"/>
-          </a:p>
-        </p:txBody>
-      </p:sp>
-    </p:spTree>
-    <p:extLst>
-      <p:ext uri="{BB962C8B-B14F-4D97-AF65-F5344CB8AC3E}">
-        <p14:creationId xmlns:p14="http://schemas.microsoft.com/office/powerpoint/2010/main" val="3236357601"/>
-      </p:ext>
-    </p:extLst>
-  </p:cSld>
-  <p:clrMapOvr>
-    <a:masterClrMapping/>
-  </p:clrMapOvr>
-</p:sld>
-</file>
-
-<file path=ppt/slides/slide2.xml><?xml version="1.0" encoding="utf-8"?>
 <p:sld xmlns:a="http://schemas.openxmlformats.org/drawingml/2006/main" xmlns:r="http://schemas.openxmlformats.org/officeDocument/2006/relationships" xmlns:p="http://schemas.openxmlformats.org/presentationml/2006/main">
   <p:cSld>
     <p:bg>
@@ -3059,10 +4224,10 @@
       </p:grpSpPr>
       <p:pic>
         <p:nvPicPr>
-          <p:cNvPr id="5" name="Picture 4" descr="A screen shot of a computer screen&#10;&#10;Description automatically generated">
+          <p:cNvPr id="3" name="Picture 2" descr="A screen shot of a game&#10;&#10;Description automatically generated">
             <a:extLst>
               <a:ext uri="{FF2B5EF4-FFF2-40B4-BE49-F238E27FC236}">
-                <a16:creationId xmlns:a16="http://schemas.microsoft.com/office/drawing/2014/main" id="{24413B47-00F2-BC41-4DDF-6566CFB1BA84}"/>
+                <a16:creationId xmlns:a16="http://schemas.microsoft.com/office/drawing/2014/main" id="{C5C4DDC0-2365-DDE6-A0BF-76D263BF5FF8}"/>
               </a:ext>
             </a:extLst>
           </p:cNvPr>
@@ -3085,8 +4250,8 @@
         </p:blipFill>
         <p:spPr>
           <a:xfrm>
-            <a:off x="7" y="1576207"/>
-            <a:ext cx="12191999" cy="6614105"/>
+            <a:off x="455874" y="1591159"/>
+            <a:ext cx="12802926" cy="6265707"/>
           </a:xfrm>
           <a:prstGeom prst="rect">
             <a:avLst/>
@@ -3122,8 +4287,8 @@
         </p:blipFill>
         <p:spPr bwMode="auto">
           <a:xfrm>
-            <a:off x="2901193" y="1900962"/>
-            <a:ext cx="698482" cy="1351898"/>
+            <a:off x="3503453" y="1790274"/>
+            <a:ext cx="733406" cy="1419493"/>
           </a:xfrm>
           <a:prstGeom prst="rect">
             <a:avLst/>
@@ -3154,8 +4319,8 @@
         </p:nvSpPr>
         <p:spPr>
           <a:xfrm>
-            <a:off x="3008256" y="3210821"/>
-            <a:ext cx="484363" cy="369332"/>
+            <a:off x="3615869" y="3165622"/>
+            <a:ext cx="499880" cy="383182"/>
           </a:xfrm>
           <a:prstGeom prst="rect">
             <a:avLst/>
@@ -3169,7 +4334,7 @@
           <a:lstStyle/>
           <a:p>
             <a:r>
-              <a:rPr lang="en-US" b="1" dirty="0">
+              <a:rPr lang="en-US" sz="1890" b="1" dirty="0">
                 <a:solidFill>
                   <a:schemeClr val="bg1"/>
                 </a:solidFill>
@@ -3208,8 +4373,8 @@
         </p:blipFill>
         <p:spPr bwMode="auto">
           <a:xfrm>
-            <a:off x="4115632" y="1394419"/>
-            <a:ext cx="1478012" cy="1351898"/>
+            <a:off x="4778617" y="1258404"/>
+            <a:ext cx="1551913" cy="1419493"/>
           </a:xfrm>
           <a:prstGeom prst="rect">
             <a:avLst/>
@@ -3240,8 +4405,8 @@
         </p:nvSpPr>
         <p:spPr>
           <a:xfrm>
-            <a:off x="4366870" y="2718611"/>
-            <a:ext cx="1048684" cy="523220"/>
+            <a:off x="5048594" y="2648807"/>
+            <a:ext cx="1088760" cy="544765"/>
           </a:xfrm>
           <a:prstGeom prst="rect">
             <a:avLst/>
@@ -3256,7 +4421,7 @@
           <a:p>
             <a:pPr algn="ctr"/>
             <a:r>
-              <a:rPr lang="en-US" sz="1400" b="1" dirty="0">
+              <a:rPr lang="en-US" sz="1470" b="1" dirty="0">
                 <a:solidFill>
                   <a:schemeClr val="bg1"/>
                 </a:solidFill>
@@ -3267,7 +4432,7 @@
           <a:p>
             <a:pPr algn="ctr"/>
             <a:r>
-              <a:rPr lang="en-US" sz="1400" b="1" dirty="0">
+              <a:rPr lang="en-US" sz="1470" b="1" dirty="0">
                 <a:solidFill>
                   <a:schemeClr val="bg1"/>
                 </a:solidFill>
@@ -3306,8 +4471,8 @@
         </p:blipFill>
         <p:spPr bwMode="auto">
           <a:xfrm>
-            <a:off x="7378348" y="1426652"/>
-            <a:ext cx="966360" cy="706136"/>
+            <a:off x="8141303" y="3060893"/>
+            <a:ext cx="832315" cy="608187"/>
           </a:xfrm>
           <a:prstGeom prst="rect">
             <a:avLst/>
@@ -3338,8 +4503,8 @@
         </p:nvSpPr>
         <p:spPr>
           <a:xfrm>
-            <a:off x="7400775" y="2079407"/>
-            <a:ext cx="958916" cy="523220"/>
+            <a:off x="8048735" y="3630057"/>
+            <a:ext cx="1017438" cy="480131"/>
           </a:xfrm>
           <a:prstGeom prst="rect">
             <a:avLst/>
@@ -3347,14 +4512,14 @@
           <a:noFill/>
         </p:spPr>
         <p:txBody>
-          <a:bodyPr wrap="none" rtlCol="0">
+          <a:bodyPr wrap="square" rtlCol="0">
             <a:spAutoFit/>
           </a:bodyPr>
           <a:lstStyle/>
           <a:p>
             <a:pPr algn="ctr"/>
             <a:r>
-              <a:rPr lang="en-US" sz="1400" b="1" dirty="0">
+              <a:rPr lang="en-US" sz="1260" b="1" dirty="0">
                 <a:solidFill>
                   <a:schemeClr val="bg1"/>
                 </a:solidFill>
@@ -3365,7 +4530,7 @@
           <a:p>
             <a:pPr algn="ctr"/>
             <a:r>
-              <a:rPr lang="en-US" sz="1400" b="1" dirty="0">
+              <a:rPr lang="en-US" sz="1260" b="1" dirty="0">
                 <a:solidFill>
                   <a:schemeClr val="bg1"/>
                 </a:solidFill>
@@ -3404,8 +4569,8 @@
         </p:blipFill>
         <p:spPr bwMode="auto">
           <a:xfrm>
-            <a:off x="8512695" y="1453416"/>
-            <a:ext cx="759470" cy="1351900"/>
+            <a:off x="9830984" y="1845918"/>
+            <a:ext cx="568936" cy="1012739"/>
           </a:xfrm>
           <a:prstGeom prst="rect">
             <a:avLst/>
@@ -3436,8 +4601,8 @@
         </p:nvSpPr>
         <p:spPr>
           <a:xfrm>
-            <a:off x="8602549" y="2755060"/>
-            <a:ext cx="622286" cy="523220"/>
+            <a:off x="9830985" y="2762879"/>
+            <a:ext cx="644728" cy="544765"/>
           </a:xfrm>
           <a:prstGeom prst="rect">
             <a:avLst/>
@@ -3451,7 +4616,7 @@
           <a:lstStyle/>
           <a:p>
             <a:r>
-              <a:rPr lang="en-US" sz="1400" b="1" dirty="0">
+              <a:rPr lang="en-US" sz="1470" b="1" dirty="0">
                 <a:solidFill>
                   <a:schemeClr val="bg1"/>
                 </a:solidFill>
@@ -3461,7 +4626,7 @@
           </a:p>
           <a:p>
             <a:r>
-              <a:rPr lang="en-US" sz="1400" b="1" dirty="0">
+              <a:rPr lang="en-US" sz="1470" b="1" dirty="0">
                 <a:solidFill>
                   <a:schemeClr val="bg1"/>
                 </a:solidFill>
@@ -3500,8 +4665,8 @@
         </p:blipFill>
         <p:spPr bwMode="auto">
           <a:xfrm>
-            <a:off x="7794612" y="4062582"/>
-            <a:ext cx="865771" cy="632419"/>
+            <a:off x="8641545" y="4059973"/>
+            <a:ext cx="909060" cy="664040"/>
           </a:xfrm>
           <a:prstGeom prst="rect">
             <a:avLst/>
@@ -3532,8 +4697,8 @@
         </p:nvSpPr>
         <p:spPr>
           <a:xfrm>
-            <a:off x="7862456" y="4654891"/>
-            <a:ext cx="689355" cy="523220"/>
+            <a:off x="8718344" y="4681901"/>
+            <a:ext cx="712696" cy="544765"/>
           </a:xfrm>
           <a:prstGeom prst="rect">
             <a:avLst/>
@@ -3548,7 +4713,7 @@
           <a:p>
             <a:pPr algn="ctr"/>
             <a:r>
-              <a:rPr lang="en-US" sz="1400" b="1" dirty="0">
+              <a:rPr lang="en-US" sz="1470" b="1" dirty="0">
                 <a:solidFill>
                   <a:schemeClr val="bg1"/>
                 </a:solidFill>
@@ -3559,7 +4724,7 @@
           <a:p>
             <a:pPr algn="ctr"/>
             <a:r>
-              <a:rPr lang="en-US" sz="1400" b="1" dirty="0">
+              <a:rPr lang="en-US" sz="1470" b="1" dirty="0">
                 <a:solidFill>
                   <a:schemeClr val="bg1"/>
                 </a:solidFill>
@@ -3585,8 +4750,8 @@
         </p:nvCxnSpPr>
         <p:spPr>
           <a:xfrm flipV="1">
-            <a:off x="8249035" y="3807254"/>
-            <a:ext cx="116962" cy="245915"/>
+            <a:off x="9118688" y="3756052"/>
+            <a:ext cx="102686" cy="294041"/>
           </a:xfrm>
           <a:prstGeom prst="straightConnector1">
             <a:avLst/>
@@ -3639,8 +4804,8 @@
         </p:blipFill>
         <p:spPr bwMode="auto">
           <a:xfrm>
-            <a:off x="6151491" y="1881006"/>
-            <a:ext cx="1478012" cy="1478012"/>
+            <a:off x="6916268" y="1718787"/>
+            <a:ext cx="1551913" cy="1551913"/>
           </a:xfrm>
           <a:prstGeom prst="rect">
             <a:avLst/>
@@ -3671,8 +4836,8 @@
         </p:nvSpPr>
         <p:spPr>
           <a:xfrm>
-            <a:off x="6486001" y="3298038"/>
-            <a:ext cx="689035" cy="523220"/>
+            <a:off x="7272131" y="3206670"/>
+            <a:ext cx="714234" cy="544765"/>
           </a:xfrm>
           <a:prstGeom prst="rect">
             <a:avLst/>
@@ -3687,7 +4852,7 @@
           <a:p>
             <a:pPr algn="ctr"/>
             <a:r>
-              <a:rPr lang="en-US" sz="1400" b="1" dirty="0">
+              <a:rPr lang="en-US" sz="1470" b="1" dirty="0">
                 <a:solidFill>
                   <a:schemeClr val="bg1"/>
                 </a:solidFill>
@@ -3698,7 +4863,7 @@
           <a:p>
             <a:pPr algn="ctr"/>
             <a:r>
-              <a:rPr lang="en-US" sz="1400" b="1" dirty="0">
+              <a:rPr lang="en-US" sz="1470" b="1" dirty="0">
                 <a:solidFill>
                   <a:schemeClr val="bg1"/>
                 </a:solidFill>
@@ -3737,8 +4902,8 @@
         </p:blipFill>
         <p:spPr bwMode="auto">
           <a:xfrm>
-            <a:off x="9459456" y="1882303"/>
-            <a:ext cx="977648" cy="1468001"/>
+            <a:off x="10452797" y="1720149"/>
+            <a:ext cx="1026530" cy="1541401"/>
           </a:xfrm>
           <a:prstGeom prst="rect">
             <a:avLst/>
@@ -3769,8 +4934,8 @@
         </p:nvSpPr>
         <p:spPr>
           <a:xfrm>
-            <a:off x="9565928" y="3302059"/>
-            <a:ext cx="834011" cy="523220"/>
+            <a:off x="10568680" y="3210893"/>
+            <a:ext cx="867545" cy="544765"/>
           </a:xfrm>
           <a:prstGeom prst="rect">
             <a:avLst/>
@@ -3785,7 +4950,7 @@
           <a:p>
             <a:pPr algn="ctr"/>
             <a:r>
-              <a:rPr lang="en-US" sz="1400" b="1" dirty="0">
+              <a:rPr lang="en-US" sz="1470" b="1" dirty="0">
                 <a:solidFill>
                   <a:schemeClr val="bg1"/>
                 </a:solidFill>
@@ -3796,7 +4961,7 @@
           <a:p>
             <a:pPr algn="ctr"/>
             <a:r>
-              <a:rPr lang="en-US" sz="1400" b="1" dirty="0">
+              <a:rPr lang="en-US" sz="1470" b="1" dirty="0">
                 <a:solidFill>
                   <a:schemeClr val="bg1"/>
                 </a:solidFill>
@@ -3822,8 +4987,8 @@
         </p:nvSpPr>
         <p:spPr bwMode="auto">
           <a:xfrm>
-            <a:off x="5943600" y="4620125"/>
-            <a:ext cx="304800" cy="304800"/>
+            <a:off x="6697980" y="4645391"/>
+            <a:ext cx="320040" cy="320040"/>
           </a:xfrm>
           <a:prstGeom prst="rect">
             <a:avLst/>
@@ -3840,14 +5005,14 @@
           </a:extLst>
         </p:spPr>
         <p:txBody>
-          <a:bodyPr vert="horz" wrap="square" lIns="91440" tIns="45721" rIns="91440" bIns="45721" numCol="1" anchor="t" anchorCtr="0" compatLnSpc="1">
+          <a:bodyPr vert="horz" wrap="square" lIns="96012" tIns="48007" rIns="96012" bIns="48007" numCol="1" anchor="t" anchorCtr="0" compatLnSpc="1">
             <a:prstTxWarp prst="textNoShape">
               <a:avLst/>
             </a:prstTxWarp>
           </a:bodyPr>
           <a:lstStyle/>
           <a:p>
-            <a:endParaRPr lang="en-US"/>
+            <a:endParaRPr lang="en-US" sz="1890"/>
           </a:p>
         </p:txBody>
       </p:sp>
@@ -3879,8 +5044,8 @@
         </p:blipFill>
         <p:spPr>
           <a:xfrm>
-            <a:off x="4880245" y="3456933"/>
-            <a:ext cx="1099448" cy="1099448"/>
+            <a:off x="5581457" y="3247173"/>
+            <a:ext cx="1154420" cy="1154420"/>
           </a:xfrm>
           <a:prstGeom prst="rect">
             <a:avLst/>
@@ -3901,8 +5066,8 @@
         </p:nvSpPr>
         <p:spPr>
           <a:xfrm>
-            <a:off x="5011438" y="4529880"/>
-            <a:ext cx="795281" cy="307777"/>
+            <a:off x="5723128" y="4373774"/>
+            <a:ext cx="827214" cy="318549"/>
           </a:xfrm>
           <a:prstGeom prst="rect">
             <a:avLst/>
@@ -3917,7 +5082,7 @@
           <a:p>
             <a:pPr algn="ctr"/>
             <a:r>
-              <a:rPr lang="en-US" sz="1400" b="1" dirty="0">
+              <a:rPr lang="en-US" sz="1470" b="1" dirty="0">
                 <a:solidFill>
                   <a:schemeClr val="bg1"/>
                 </a:solidFill>
@@ -3941,8 +5106,8 @@
         </p:nvSpPr>
         <p:spPr>
           <a:xfrm>
-            <a:off x="131201" y="307527"/>
-            <a:ext cx="5904544" cy="863932"/>
+            <a:off x="594964" y="117166"/>
+            <a:ext cx="6199771" cy="907129"/>
           </a:xfrm>
           <a:prstGeom prst="roundRect">
             <a:avLst/>
@@ -3972,7 +5137,7 @@
           <a:lstStyle/>
           <a:p>
             <a:r>
-              <a:rPr lang="en-US" sz="2800" b="1" dirty="0">
+              <a:rPr lang="en-US" sz="2940" b="1" dirty="0">
                 <a:solidFill>
                   <a:schemeClr val="bg1"/>
                 </a:solidFill>
@@ -3980,14 +5145,14 @@
               <a:t>r/NBA AMAs  </a:t>
             </a:r>
             <a:r>
-              <a:rPr lang="en-US" sz="2400" b="1" dirty="0">
+              <a:rPr lang="en-US" sz="2520" b="1" dirty="0">
                 <a:solidFill>
                   <a:schemeClr val="bg1"/>
                 </a:solidFill>
               </a:rPr>
               <a:t>2015/12/03 to 2023/11/19</a:t>
             </a:r>
-            <a:endParaRPr lang="en-US" sz="2800" b="1" dirty="0">
+            <a:endParaRPr lang="en-US" sz="2940" b="1" dirty="0">
               <a:solidFill>
                 <a:schemeClr val="bg1"/>
               </a:solidFill>
@@ -3995,14 +5160,14 @@
           </a:p>
           <a:p>
             <a:r>
-              <a:rPr lang="en-US" sz="1400" b="1" i="1" dirty="0">
+              <a:rPr lang="en-US" sz="1470" b="1" i="1" dirty="0">
                 <a:solidFill>
                   <a:schemeClr val="bg1"/>
                 </a:solidFill>
               </a:rPr>
               <a:t>Size represents # of comments</a:t>
             </a:r>
-            <a:endParaRPr lang="en-US" sz="2400" b="1" i="1" dirty="0">
+            <a:endParaRPr lang="en-US" sz="2520" b="1" i="1" dirty="0">
               <a:solidFill>
                 <a:schemeClr val="bg1"/>
               </a:solidFill>
@@ -4024,8 +5189,8 @@
         </p:nvSpPr>
         <p:spPr>
           <a:xfrm>
-            <a:off x="6160399" y="309491"/>
-            <a:ext cx="5900405" cy="863932"/>
+            <a:off x="6925624" y="119228"/>
+            <a:ext cx="6195425" cy="907129"/>
           </a:xfrm>
           <a:prstGeom prst="roundRect">
             <a:avLst/>
@@ -4055,7 +5220,7 @@
           <a:lstStyle/>
           <a:p>
             <a:r>
-              <a:rPr lang="en-US" sz="1400" dirty="0">
+              <a:rPr lang="en-US" sz="1470" dirty="0">
                 <a:solidFill>
                   <a:srgbClr val="FFFFFF"/>
                 </a:solidFill>
@@ -4063,7 +5228,7 @@
               </a:rPr>
               <a:t>This visualization tracks Ask Me Anything threads in r/NBA. Active Players and a Ballboy captured most attention. There are elevated engagement levels between 2019 and 2022 very likely attributable to work from home.</a:t>
             </a:r>
-            <a:endParaRPr lang="en-US" sz="1400" b="1" i="1" dirty="0">
+            <a:endParaRPr lang="en-US" sz="1470" b="1" i="1" dirty="0">
               <a:solidFill>
                 <a:schemeClr val="bg1"/>
               </a:solidFill>
@@ -4071,10 +5236,191 @@
           </a:p>
         </p:txBody>
       </p:sp>
+      <p:cxnSp>
+        <p:nvCxnSpPr>
+          <p:cNvPr id="4" name="Straight Arrow Connector 3">
+            <a:extLst>
+              <a:ext uri="{FF2B5EF4-FFF2-40B4-BE49-F238E27FC236}">
+                <a16:creationId xmlns:a16="http://schemas.microsoft.com/office/drawing/2014/main" id="{3E57B7E7-7622-98AC-5B61-5D9A12EF0774}"/>
+              </a:ext>
+            </a:extLst>
+          </p:cNvPr>
+          <p:cNvCxnSpPr>
+            <a:cxnSpLocks/>
+          </p:cNvCxnSpPr>
+          <p:nvPr/>
+        </p:nvCxnSpPr>
+        <p:spPr>
+          <a:xfrm flipV="1">
+            <a:off x="8605911" y="2818816"/>
+            <a:ext cx="175846" cy="218751"/>
+          </a:xfrm>
+          <a:prstGeom prst="straightConnector1">
+            <a:avLst/>
+          </a:prstGeom>
+          <a:ln>
+            <a:tailEnd type="triangle"/>
+          </a:ln>
+        </p:spPr>
+        <p:style>
+          <a:lnRef idx="2">
+            <a:schemeClr val="accent1"/>
+          </a:lnRef>
+          <a:fillRef idx="0">
+            <a:schemeClr val="accent1"/>
+          </a:fillRef>
+          <a:effectRef idx="1">
+            <a:schemeClr val="accent1"/>
+          </a:effectRef>
+          <a:fontRef idx="minor">
+            <a:schemeClr val="tx1"/>
+          </a:fontRef>
+        </p:style>
+      </p:cxnSp>
+      <p:cxnSp>
+        <p:nvCxnSpPr>
+          <p:cNvPr id="23" name="Straight Arrow Connector 22">
+            <a:extLst>
+              <a:ext uri="{FF2B5EF4-FFF2-40B4-BE49-F238E27FC236}">
+                <a16:creationId xmlns:a16="http://schemas.microsoft.com/office/drawing/2014/main" id="{322B4B57-3D1A-501E-407B-1C19F1ED216E}"/>
+              </a:ext>
+            </a:extLst>
+          </p:cNvPr>
+          <p:cNvCxnSpPr>
+            <a:cxnSpLocks/>
+            <a:stCxn id="9" idx="1"/>
+          </p:cNvCxnSpPr>
+          <p:nvPr/>
+        </p:nvCxnSpPr>
+        <p:spPr>
+          <a:xfrm flipH="1">
+            <a:off x="9550603" y="3035262"/>
+            <a:ext cx="280383" cy="171407"/>
+          </a:xfrm>
+          <a:prstGeom prst="straightConnector1">
+            <a:avLst/>
+          </a:prstGeom>
+          <a:ln>
+            <a:tailEnd type="triangle"/>
+          </a:ln>
+        </p:spPr>
+        <p:style>
+          <a:lnRef idx="2">
+            <a:schemeClr val="accent1"/>
+          </a:lnRef>
+          <a:fillRef idx="0">
+            <a:schemeClr val="accent1"/>
+          </a:fillRef>
+          <a:effectRef idx="1">
+            <a:schemeClr val="accent1"/>
+          </a:effectRef>
+          <a:fontRef idx="minor">
+            <a:schemeClr val="tx1"/>
+          </a:fontRef>
+        </p:style>
+      </p:cxnSp>
+      <p:pic>
+        <p:nvPicPr>
+          <p:cNvPr id="33" name="Picture 2" descr="Anthony Davis - TheSportsDB.com">
+            <a:extLst>
+              <a:ext uri="{FF2B5EF4-FFF2-40B4-BE49-F238E27FC236}">
+                <a16:creationId xmlns:a16="http://schemas.microsoft.com/office/drawing/2014/main" id="{618E496F-FD92-CB6F-D193-FB232A72DF71}"/>
+              </a:ext>
+            </a:extLst>
+          </p:cNvPr>
+          <p:cNvPicPr>
+            <a:picLocks noChangeAspect="1" noChangeArrowheads="1"/>
+          </p:cNvPicPr>
+          <p:nvPr/>
+        </p:nvPicPr>
+        <p:blipFill>
+          <a:blip r:embed="rId11">
+            <a:extLst>
+              <a:ext uri="{28A0092B-C50C-407E-A947-70E740481C1C}">
+                <a14:useLocalDpi xmlns:a14="http://schemas.microsoft.com/office/drawing/2010/main" val="0"/>
+              </a:ext>
+            </a:extLst>
+          </a:blip>
+          <a:srcRect/>
+          <a:stretch>
+            <a:fillRect/>
+          </a:stretch>
+        </p:blipFill>
+        <p:spPr bwMode="auto">
+          <a:xfrm>
+            <a:off x="8920763" y="1301671"/>
+            <a:ext cx="758752" cy="758752"/>
+          </a:xfrm>
+          <a:prstGeom prst="rect">
+            <a:avLst/>
+          </a:prstGeom>
+          <a:noFill/>
+          <a:extLst>
+            <a:ext uri="{909E8E84-426E-40DD-AFC4-6F175D3DCCD1}">
+              <a14:hiddenFill xmlns:a14="http://schemas.microsoft.com/office/drawing/2010/main">
+                <a:solidFill>
+                  <a:srgbClr val="FFFFFF"/>
+                </a:solidFill>
+              </a14:hiddenFill>
+            </a:ext>
+          </a:extLst>
+        </p:spPr>
+      </p:pic>
+      <p:sp>
+        <p:nvSpPr>
+          <p:cNvPr id="34" name="TextBox 33">
+            <a:extLst>
+              <a:ext uri="{FF2B5EF4-FFF2-40B4-BE49-F238E27FC236}">
+                <a16:creationId xmlns:a16="http://schemas.microsoft.com/office/drawing/2014/main" id="{EF80AF4B-902D-B20C-1437-B35AEB01C919}"/>
+              </a:ext>
+            </a:extLst>
+          </p:cNvPr>
+          <p:cNvSpPr txBox="1"/>
+          <p:nvPr/>
+        </p:nvSpPr>
+        <p:spPr>
+          <a:xfrm>
+            <a:off x="8872026" y="1998468"/>
+            <a:ext cx="933974" cy="544765"/>
+          </a:xfrm>
+          <a:prstGeom prst="rect">
+            <a:avLst/>
+          </a:prstGeom>
+          <a:noFill/>
+        </p:spPr>
+        <p:txBody>
+          <a:bodyPr wrap="none" rtlCol="0">
+            <a:spAutoFit/>
+          </a:bodyPr>
+          <a:lstStyle/>
+          <a:p>
+            <a:pPr algn="ctr"/>
+            <a:r>
+              <a:rPr lang="en-US" sz="1470" b="1" dirty="0">
+                <a:solidFill>
+                  <a:schemeClr val="bg1"/>
+                </a:solidFill>
+              </a:rPr>
+              <a:t>Anthony </a:t>
+            </a:r>
+          </a:p>
+          <a:p>
+            <a:pPr algn="ctr"/>
+            <a:r>
+              <a:rPr lang="en-US" sz="1470" b="1" dirty="0">
+                <a:solidFill>
+                  <a:schemeClr val="bg1"/>
+                </a:solidFill>
+              </a:rPr>
+              <a:t>Davis</a:t>
+            </a:r>
+          </a:p>
+        </p:txBody>
+      </p:sp>
     </p:spTree>
     <p:extLst>
       <p:ext uri="{BB962C8B-B14F-4D97-AF65-F5344CB8AC3E}">
-        <p14:creationId xmlns:p14="http://schemas.microsoft.com/office/powerpoint/2010/main" val="1378656094"/>
+        <p14:creationId xmlns:p14="http://schemas.microsoft.com/office/powerpoint/2010/main" val="1169629662"/>
       </p:ext>
     </p:extLst>
   </p:cSld>

</xml_diff>